<commit_message>
Updated demo libraries to more current versions
</commit_message>
<xml_diff>
--- a/slides/winning_with_web_components.pptx
+++ b/slides/winning_with_web_components.pptx
@@ -2,7 +2,7 @@
 <file path=ppt/presentation.xml><?xml version="1.0" encoding="utf-8"?>
 <p:presentation xmlns:a="http://schemas.openxmlformats.org/drawingml/2006/main" xmlns:r="http://schemas.openxmlformats.org/officeDocument/2006/relationships" xmlns:p="http://schemas.openxmlformats.org/presentationml/2006/main" saveSubsetFonts="1">
   <p:sldMasterIdLst>
-    <p:sldMasterId id="2147483660" r:id="rId1"/>
+    <p:sldMasterId id="2147483648" r:id="rId1"/>
   </p:sldMasterIdLst>
   <p:notesMasterIdLst>
     <p:notesMasterId r:id="rId26"/>
@@ -33,13 +33,13 @@
     <p:sldId id="273" r:id="rId24"/>
     <p:sldId id="280" r:id="rId25"/>
   </p:sldIdLst>
-  <p:sldSz cx="9144000" cy="6858000" type="screen4x3"/>
+  <p:sldSz cx="12192000" cy="6858000"/>
   <p:notesSz cx="6858000" cy="9144000"/>
   <p:defaultTextStyle>
     <a:defPPr>
       <a:defRPr lang="en-US"/>
     </a:defPPr>
-    <a:lvl1pPr marL="0" algn="l" defTabSz="457200" rtl="0" eaLnBrk="1" latinLnBrk="0" hangingPunct="1">
+    <a:lvl1pPr marL="0" algn="l" defTabSz="914400" rtl="0" eaLnBrk="1" latinLnBrk="0" hangingPunct="1">
       <a:defRPr sz="1800" kern="1200">
         <a:solidFill>
           <a:schemeClr val="tx1"/>
@@ -49,7 +49,7 @@
         <a:cs typeface="+mn-cs"/>
       </a:defRPr>
     </a:lvl1pPr>
-    <a:lvl2pPr marL="457200" algn="l" defTabSz="457200" rtl="0" eaLnBrk="1" latinLnBrk="0" hangingPunct="1">
+    <a:lvl2pPr marL="457200" algn="l" defTabSz="914400" rtl="0" eaLnBrk="1" latinLnBrk="0" hangingPunct="1">
       <a:defRPr sz="1800" kern="1200">
         <a:solidFill>
           <a:schemeClr val="tx1"/>
@@ -59,7 +59,7 @@
         <a:cs typeface="+mn-cs"/>
       </a:defRPr>
     </a:lvl2pPr>
-    <a:lvl3pPr marL="914400" algn="l" defTabSz="457200" rtl="0" eaLnBrk="1" latinLnBrk="0" hangingPunct="1">
+    <a:lvl3pPr marL="914400" algn="l" defTabSz="914400" rtl="0" eaLnBrk="1" latinLnBrk="0" hangingPunct="1">
       <a:defRPr sz="1800" kern="1200">
         <a:solidFill>
           <a:schemeClr val="tx1"/>
@@ -69,7 +69,7 @@
         <a:cs typeface="+mn-cs"/>
       </a:defRPr>
     </a:lvl3pPr>
-    <a:lvl4pPr marL="1371600" algn="l" defTabSz="457200" rtl="0" eaLnBrk="1" latinLnBrk="0" hangingPunct="1">
+    <a:lvl4pPr marL="1371600" algn="l" defTabSz="914400" rtl="0" eaLnBrk="1" latinLnBrk="0" hangingPunct="1">
       <a:defRPr sz="1800" kern="1200">
         <a:solidFill>
           <a:schemeClr val="tx1"/>
@@ -79,7 +79,7 @@
         <a:cs typeface="+mn-cs"/>
       </a:defRPr>
     </a:lvl4pPr>
-    <a:lvl5pPr marL="1828800" algn="l" defTabSz="457200" rtl="0" eaLnBrk="1" latinLnBrk="0" hangingPunct="1">
+    <a:lvl5pPr marL="1828800" algn="l" defTabSz="914400" rtl="0" eaLnBrk="1" latinLnBrk="0" hangingPunct="1">
       <a:defRPr sz="1800" kern="1200">
         <a:solidFill>
           <a:schemeClr val="tx1"/>
@@ -89,7 +89,7 @@
         <a:cs typeface="+mn-cs"/>
       </a:defRPr>
     </a:lvl5pPr>
-    <a:lvl6pPr marL="2286000" algn="l" defTabSz="457200" rtl="0" eaLnBrk="1" latinLnBrk="0" hangingPunct="1">
+    <a:lvl6pPr marL="2286000" algn="l" defTabSz="914400" rtl="0" eaLnBrk="1" latinLnBrk="0" hangingPunct="1">
       <a:defRPr sz="1800" kern="1200">
         <a:solidFill>
           <a:schemeClr val="tx1"/>
@@ -99,7 +99,7 @@
         <a:cs typeface="+mn-cs"/>
       </a:defRPr>
     </a:lvl6pPr>
-    <a:lvl7pPr marL="2743200" algn="l" defTabSz="457200" rtl="0" eaLnBrk="1" latinLnBrk="0" hangingPunct="1">
+    <a:lvl7pPr marL="2743200" algn="l" defTabSz="914400" rtl="0" eaLnBrk="1" latinLnBrk="0" hangingPunct="1">
       <a:defRPr sz="1800" kern="1200">
         <a:solidFill>
           <a:schemeClr val="tx1"/>
@@ -109,7 +109,7 @@
         <a:cs typeface="+mn-cs"/>
       </a:defRPr>
     </a:lvl7pPr>
-    <a:lvl8pPr marL="3200400" algn="l" defTabSz="457200" rtl="0" eaLnBrk="1" latinLnBrk="0" hangingPunct="1">
+    <a:lvl8pPr marL="3200400" algn="l" defTabSz="914400" rtl="0" eaLnBrk="1" latinLnBrk="0" hangingPunct="1">
       <a:defRPr sz="1800" kern="1200">
         <a:solidFill>
           <a:schemeClr val="tx1"/>
@@ -119,7 +119,7 @@
         <a:cs typeface="+mn-cs"/>
       </a:defRPr>
     </a:lvl8pPr>
-    <a:lvl9pPr marL="3657600" algn="l" defTabSz="457200" rtl="0" eaLnBrk="1" latinLnBrk="0" hangingPunct="1">
+    <a:lvl9pPr marL="3657600" algn="l" defTabSz="914400" rtl="0" eaLnBrk="1" latinLnBrk="0" hangingPunct="1">
       <a:defRPr sz="1800" kern="1200">
         <a:solidFill>
           <a:schemeClr val="tx1"/>
@@ -1394,7 +1394,7 @@
           <a:p>
             <a:fld id="{635F037B-416E-4368-9659-A4B06A941989}" type="datetimeFigureOut">
               <a:rPr lang="en-US" smtClean="0"/>
-              <a:t>4/20/2018</a:t>
+              <a:t>4/12/2018</a:t>
             </a:fld>
             <a:endParaRPr lang="en-US"/>
           </a:p>
@@ -1412,8 +1412,8 @@
         </p:nvSpPr>
         <p:spPr>
           <a:xfrm>
-            <a:off x="1371600" y="1143000"/>
-            <a:ext cx="4114800" cy="3086100"/>
+            <a:off x="685800" y="1143000"/>
+            <a:ext cx="5486400" cy="3086100"/>
           </a:xfrm>
           <a:prstGeom prst="rect">
             <a:avLst/>
@@ -1688,12 +1688,7 @@
             <p:ph type="sldImg"/>
           </p:nvPr>
         </p:nvSpPr>
-        <p:spPr>
-          <a:xfrm>
-            <a:off x="1371600" y="1143000"/>
-            <a:ext cx="4114800" cy="3086100"/>
-          </a:xfrm>
-        </p:spPr>
+        <p:spPr/>
       </p:sp>
       <p:sp>
         <p:nvSpPr>
@@ -1911,12 +1906,7 @@
             <p:ph type="sldImg"/>
           </p:nvPr>
         </p:nvSpPr>
-        <p:spPr>
-          <a:xfrm>
-            <a:off x="1371600" y="1143000"/>
-            <a:ext cx="4114800" cy="3086100"/>
-          </a:xfrm>
-        </p:spPr>
+        <p:spPr/>
       </p:sp>
       <p:sp>
         <p:nvSpPr>
@@ -2003,12 +1993,7 @@
             <p:ph type="sldImg"/>
           </p:nvPr>
         </p:nvSpPr>
-        <p:spPr>
-          <a:xfrm>
-            <a:off x="1371600" y="1143000"/>
-            <a:ext cx="4114800" cy="3086100"/>
-          </a:xfrm>
-        </p:spPr>
+        <p:spPr/>
       </p:sp>
       <p:sp>
         <p:nvSpPr>
@@ -2098,12 +2083,7 @@
             <p:ph type="sldImg"/>
           </p:nvPr>
         </p:nvSpPr>
-        <p:spPr>
-          <a:xfrm>
-            <a:off x="1371600" y="1143000"/>
-            <a:ext cx="4114800" cy="3086100"/>
-          </a:xfrm>
-        </p:spPr>
+        <p:spPr/>
       </p:sp>
       <p:sp>
         <p:nvSpPr>
@@ -2208,12 +2188,7 @@
             <p:ph type="sldImg"/>
           </p:nvPr>
         </p:nvSpPr>
-        <p:spPr>
-          <a:xfrm>
-            <a:off x="1371600" y="1143000"/>
-            <a:ext cx="4114800" cy="3086100"/>
-          </a:xfrm>
-        </p:spPr>
+        <p:spPr/>
       </p:sp>
       <p:sp>
         <p:nvSpPr>
@@ -2297,12 +2272,7 @@
             <p:ph type="sldImg"/>
           </p:nvPr>
         </p:nvSpPr>
-        <p:spPr>
-          <a:xfrm>
-            <a:off x="1371600" y="1143000"/>
-            <a:ext cx="4114800" cy="3086100"/>
-          </a:xfrm>
-        </p:spPr>
+        <p:spPr/>
       </p:sp>
       <p:sp>
         <p:nvSpPr>
@@ -2398,12 +2368,7 @@
             <p:ph type="sldImg"/>
           </p:nvPr>
         </p:nvSpPr>
-        <p:spPr>
-          <a:xfrm>
-            <a:off x="1371600" y="1143000"/>
-            <a:ext cx="4114800" cy="3086100"/>
-          </a:xfrm>
-        </p:spPr>
+        <p:spPr/>
       </p:sp>
       <p:sp>
         <p:nvSpPr>
@@ -2514,12 +2479,7 @@
             <p:ph type="sldImg"/>
           </p:nvPr>
         </p:nvSpPr>
-        <p:spPr>
-          <a:xfrm>
-            <a:off x="1371600" y="1143000"/>
-            <a:ext cx="4114800" cy="3086100"/>
-          </a:xfrm>
-        </p:spPr>
+        <p:spPr/>
       </p:sp>
       <p:sp>
         <p:nvSpPr>
@@ -2652,12 +2612,7 @@
             <p:ph type="sldImg"/>
           </p:nvPr>
         </p:nvSpPr>
-        <p:spPr>
-          <a:xfrm>
-            <a:off x="1371600" y="1143000"/>
-            <a:ext cx="4114800" cy="3086100"/>
-          </a:xfrm>
-        </p:spPr>
+        <p:spPr/>
       </p:sp>
       <p:sp>
         <p:nvSpPr>
@@ -2783,12 +2738,7 @@
             <p:ph type="sldImg"/>
           </p:nvPr>
         </p:nvSpPr>
-        <p:spPr>
-          <a:xfrm>
-            <a:off x="1371600" y="1143000"/>
-            <a:ext cx="4114800" cy="3086100"/>
-          </a:xfrm>
-        </p:spPr>
+        <p:spPr/>
       </p:sp>
       <p:sp>
         <p:nvSpPr>
@@ -2892,12 +2842,7 @@
             <p:ph type="sldImg"/>
           </p:nvPr>
         </p:nvSpPr>
-        <p:spPr>
-          <a:xfrm>
-            <a:off x="1371600" y="1143000"/>
-            <a:ext cx="4114800" cy="3086100"/>
-          </a:xfrm>
-        </p:spPr>
+        <p:spPr/>
       </p:sp>
       <p:sp>
         <p:nvSpPr>
@@ -2981,12 +2926,7 @@
             <p:ph type="sldImg"/>
           </p:nvPr>
         </p:nvSpPr>
-        <p:spPr>
-          <a:xfrm>
-            <a:off x="1371600" y="1143000"/>
-            <a:ext cx="4114800" cy="3086100"/>
-          </a:xfrm>
-        </p:spPr>
+        <p:spPr/>
       </p:sp>
       <p:sp>
         <p:nvSpPr>
@@ -3073,12 +3013,7 @@
             <p:ph type="sldImg"/>
           </p:nvPr>
         </p:nvSpPr>
-        <p:spPr>
-          <a:xfrm>
-            <a:off x="1371600" y="1143000"/>
-            <a:ext cx="4114800" cy="3086100"/>
-          </a:xfrm>
-        </p:spPr>
+        <p:spPr/>
       </p:sp>
       <p:sp>
         <p:nvSpPr>
@@ -3177,12 +3112,7 @@
             <p:ph type="sldImg"/>
           </p:nvPr>
         </p:nvSpPr>
-        <p:spPr>
-          <a:xfrm>
-            <a:off x="1371600" y="1143000"/>
-            <a:ext cx="4114800" cy="3086100"/>
-          </a:xfrm>
-        </p:spPr>
+        <p:spPr/>
       </p:sp>
       <p:sp>
         <p:nvSpPr>
@@ -3317,12 +3247,7 @@
             <p:ph type="sldImg"/>
           </p:nvPr>
         </p:nvSpPr>
-        <p:spPr>
-          <a:xfrm>
-            <a:off x="1371600" y="1143000"/>
-            <a:ext cx="4114800" cy="3086100"/>
-          </a:xfrm>
-        </p:spPr>
+        <p:spPr/>
       </p:sp>
       <p:sp>
         <p:nvSpPr>
@@ -3342,15 +3267,6 @@
             <a:r>
               <a:rPr lang="en-US" dirty="0"/>
               <a:t>WWW wasn’t meant for web applications</a:t>
-            </a:r>
-          </a:p>
-          <a:p>
-            <a:endParaRPr lang="en-US" dirty="0" smtClean="0"/>
-          </a:p>
-          <a:p>
-            <a:r>
-              <a:rPr lang="en-US" dirty="0" smtClean="0"/>
-              <a:t>… but we did it anyway</a:t>
             </a:r>
           </a:p>
           <a:p>
@@ -3421,12 +3337,7 @@
             <p:ph type="sldImg"/>
           </p:nvPr>
         </p:nvSpPr>
-        <p:spPr>
-          <a:xfrm>
-            <a:off x="1371600" y="1143000"/>
-            <a:ext cx="4114800" cy="3086100"/>
-          </a:xfrm>
-        </p:spPr>
+        <p:spPr/>
       </p:sp>
       <p:sp>
         <p:nvSpPr>
@@ -3513,12 +3424,7 @@
             <p:ph type="sldImg"/>
           </p:nvPr>
         </p:nvSpPr>
-        <p:spPr>
-          <a:xfrm>
-            <a:off x="1371600" y="1143000"/>
-            <a:ext cx="4114800" cy="3086100"/>
-          </a:xfrm>
-        </p:spPr>
+        <p:spPr/>
       </p:sp>
       <p:sp>
         <p:nvSpPr>
@@ -3619,12 +3525,7 @@
             <p:ph type="sldImg"/>
           </p:nvPr>
         </p:nvSpPr>
-        <p:spPr>
-          <a:xfrm>
-            <a:off x="1371600" y="1143000"/>
-            <a:ext cx="4114800" cy="3086100"/>
-          </a:xfrm>
-        </p:spPr>
+        <p:spPr/>
       </p:sp>
       <p:sp>
         <p:nvSpPr>
@@ -3729,12 +3630,7 @@
             <p:ph type="sldImg"/>
           </p:nvPr>
         </p:nvSpPr>
-        <p:spPr>
-          <a:xfrm>
-            <a:off x="1371600" y="1143000"/>
-            <a:ext cx="4114800" cy="3086100"/>
-          </a:xfrm>
-        </p:spPr>
+        <p:spPr/>
       </p:sp>
       <p:sp>
         <p:nvSpPr>
@@ -3859,12 +3755,7 @@
             <p:ph type="sldImg"/>
           </p:nvPr>
         </p:nvSpPr>
-        <p:spPr>
-          <a:xfrm>
-            <a:off x="1371600" y="1143000"/>
-            <a:ext cx="4114800" cy="3086100"/>
-          </a:xfrm>
-        </p:spPr>
+        <p:spPr/>
       </p:sp>
       <p:sp>
         <p:nvSpPr>
@@ -3962,12 +3853,7 @@
             <p:ph type="sldImg"/>
           </p:nvPr>
         </p:nvSpPr>
-        <p:spPr>
-          <a:xfrm>
-            <a:off x="1371600" y="1143000"/>
-            <a:ext cx="4114800" cy="3086100"/>
-          </a:xfrm>
-        </p:spPr>
+        <p:spPr/>
       </p:sp>
       <p:sp>
         <p:nvSpPr>
@@ -4085,8 +3971,8 @@
         </p:nvSpPr>
         <p:spPr>
           <a:xfrm>
-            <a:off x="685800" y="1122363"/>
-            <a:ext cx="7772400" cy="2387600"/>
+            <a:off x="1524000" y="1122363"/>
+            <a:ext cx="9144000" cy="2387600"/>
           </a:xfrm>
         </p:spPr>
         <p:txBody>
@@ -4098,10 +3984,9 @@
           </a:lstStyle>
           <a:p>
             <a:r>
-              <a:rPr lang="en-US" smtClean="0"/>
+              <a:rPr lang="en-US"/>
               <a:t>Click to edit Master title style</a:t>
             </a:r>
-            <a:endParaRPr lang="en-US" dirty="0"/>
           </a:p>
         </p:txBody>
       </p:sp>
@@ -4117,8 +4002,8 @@
         </p:nvSpPr>
         <p:spPr>
           <a:xfrm>
-            <a:off x="1143000" y="3602038"/>
-            <a:ext cx="6858000" cy="1655762"/>
+            <a:off x="1524000" y="3602038"/>
+            <a:ext cx="9144000" cy="1655762"/>
           </a:xfrm>
         </p:spPr>
         <p:txBody>
@@ -4163,10 +4048,9 @@
           </a:lstStyle>
           <a:p>
             <a:r>
-              <a:rPr lang="en-US" smtClean="0"/>
+              <a:rPr lang="en-US"/>
               <a:t>Click to edit Master subtitle style</a:t>
             </a:r>
-            <a:endParaRPr lang="en-US" dirty="0"/>
           </a:p>
         </p:txBody>
       </p:sp>
@@ -4187,7 +4071,7 @@
           <a:p>
             <a:fld id="{F1FA7AC5-6045-4418-8E60-F48788734473}" type="datetimeFigureOut">
               <a:rPr lang="en-US" smtClean="0"/>
-              <a:t>4/20/2018</a:t>
+              <a:t>4/12/2018</a:t>
             </a:fld>
             <a:endParaRPr lang="en-US"/>
           </a:p>
@@ -4238,7 +4122,7 @@
     </p:spTree>
     <p:extLst>
       <p:ext uri="{BB962C8B-B14F-4D97-AF65-F5344CB8AC3E}">
-        <p14:creationId xmlns:p14="http://schemas.microsoft.com/office/powerpoint/2010/main" val="1587298491"/>
+        <p14:creationId xmlns:p14="http://schemas.microsoft.com/office/powerpoint/2010/main" val="508168537"/>
       </p:ext>
     </p:extLst>
   </p:cSld>
@@ -4281,10 +4165,9 @@
           <a:lstStyle/>
           <a:p>
             <a:r>
-              <a:rPr lang="en-US" smtClean="0"/>
+              <a:rPr lang="en-US"/>
               <a:t>Click to edit Master title style</a:t>
             </a:r>
-            <a:endParaRPr lang="en-US" dirty="0"/>
           </a:p>
         </p:txBody>
       </p:sp>
@@ -4305,38 +4188,37 @@
           <a:p>
             <a:pPr lvl="0"/>
             <a:r>
-              <a:rPr lang="en-US" smtClean="0"/>
-              <a:t>Edit Master text styles</a:t>
+              <a:rPr lang="en-US"/>
+              <a:t>Click to edit Master text styles</a:t>
             </a:r>
           </a:p>
           <a:p>
             <a:pPr lvl="1"/>
             <a:r>
-              <a:rPr lang="en-US" smtClean="0"/>
+              <a:rPr lang="en-US"/>
               <a:t>Second level</a:t>
             </a:r>
           </a:p>
           <a:p>
             <a:pPr lvl="2"/>
             <a:r>
-              <a:rPr lang="en-US" smtClean="0"/>
+              <a:rPr lang="en-US"/>
               <a:t>Third level</a:t>
             </a:r>
           </a:p>
           <a:p>
             <a:pPr lvl="3"/>
             <a:r>
-              <a:rPr lang="en-US" smtClean="0"/>
+              <a:rPr lang="en-US"/>
               <a:t>Fourth level</a:t>
             </a:r>
           </a:p>
           <a:p>
             <a:pPr lvl="4"/>
             <a:r>
-              <a:rPr lang="en-US" smtClean="0"/>
+              <a:rPr lang="en-US"/>
               <a:t>Fifth level</a:t>
             </a:r>
-            <a:endParaRPr lang="en-US" dirty="0"/>
           </a:p>
         </p:txBody>
       </p:sp>
@@ -4357,7 +4239,7 @@
           <a:p>
             <a:fld id="{F1FA7AC5-6045-4418-8E60-F48788734473}" type="datetimeFigureOut">
               <a:rPr lang="en-US" smtClean="0"/>
-              <a:t>4/20/2018</a:t>
+              <a:t>4/12/2018</a:t>
             </a:fld>
             <a:endParaRPr lang="en-US"/>
           </a:p>
@@ -4408,7 +4290,7 @@
     </p:spTree>
     <p:extLst>
       <p:ext uri="{BB962C8B-B14F-4D97-AF65-F5344CB8AC3E}">
-        <p14:creationId xmlns:p14="http://schemas.microsoft.com/office/powerpoint/2010/main" val="1882004169"/>
+        <p14:creationId xmlns:p14="http://schemas.microsoft.com/office/powerpoint/2010/main" val="613236000"/>
       </p:ext>
     </p:extLst>
   </p:cSld>
@@ -4447,8 +4329,8 @@
         </p:nvSpPr>
         <p:spPr>
           <a:xfrm>
-            <a:off x="6543675" y="365125"/>
-            <a:ext cx="1971675" cy="5811838"/>
+            <a:off x="8724900" y="365125"/>
+            <a:ext cx="2628900" cy="5811838"/>
           </a:xfrm>
         </p:spPr>
         <p:txBody>
@@ -4456,10 +4338,9 @@
           <a:lstStyle/>
           <a:p>
             <a:r>
-              <a:rPr lang="en-US" smtClean="0"/>
+              <a:rPr lang="en-US"/>
               <a:t>Click to edit Master title style</a:t>
             </a:r>
-            <a:endParaRPr lang="en-US" dirty="0"/>
           </a:p>
         </p:txBody>
       </p:sp>
@@ -4475,8 +4356,8 @@
         </p:nvSpPr>
         <p:spPr>
           <a:xfrm>
-            <a:off x="628650" y="365125"/>
-            <a:ext cx="5800725" cy="5811838"/>
+            <a:off x="838200" y="365125"/>
+            <a:ext cx="7734300" cy="5811838"/>
           </a:xfrm>
         </p:spPr>
         <p:txBody>
@@ -4485,38 +4366,37 @@
           <a:p>
             <a:pPr lvl="0"/>
             <a:r>
-              <a:rPr lang="en-US" smtClean="0"/>
-              <a:t>Edit Master text styles</a:t>
+              <a:rPr lang="en-US"/>
+              <a:t>Click to edit Master text styles</a:t>
             </a:r>
           </a:p>
           <a:p>
             <a:pPr lvl="1"/>
             <a:r>
-              <a:rPr lang="en-US" smtClean="0"/>
+              <a:rPr lang="en-US"/>
               <a:t>Second level</a:t>
             </a:r>
           </a:p>
           <a:p>
             <a:pPr lvl="2"/>
             <a:r>
-              <a:rPr lang="en-US" smtClean="0"/>
+              <a:rPr lang="en-US"/>
               <a:t>Third level</a:t>
             </a:r>
           </a:p>
           <a:p>
             <a:pPr lvl="3"/>
             <a:r>
-              <a:rPr lang="en-US" smtClean="0"/>
+              <a:rPr lang="en-US"/>
               <a:t>Fourth level</a:t>
             </a:r>
           </a:p>
           <a:p>
             <a:pPr lvl="4"/>
             <a:r>
-              <a:rPr lang="en-US" smtClean="0"/>
+              <a:rPr lang="en-US"/>
               <a:t>Fifth level</a:t>
             </a:r>
-            <a:endParaRPr lang="en-US" dirty="0"/>
           </a:p>
         </p:txBody>
       </p:sp>
@@ -4537,7 +4417,7 @@
           <a:p>
             <a:fld id="{F1FA7AC5-6045-4418-8E60-F48788734473}" type="datetimeFigureOut">
               <a:rPr lang="en-US" smtClean="0"/>
-              <a:t>4/20/2018</a:t>
+              <a:t>4/12/2018</a:t>
             </a:fld>
             <a:endParaRPr lang="en-US"/>
           </a:p>
@@ -4588,7 +4468,7 @@
     </p:spTree>
     <p:extLst>
       <p:ext uri="{BB962C8B-B14F-4D97-AF65-F5344CB8AC3E}">
-        <p14:creationId xmlns:p14="http://schemas.microsoft.com/office/powerpoint/2010/main" val="3300112371"/>
+        <p14:creationId xmlns:p14="http://schemas.microsoft.com/office/powerpoint/2010/main" val="2660566950"/>
       </p:ext>
     </p:extLst>
   </p:cSld>
@@ -4631,10 +4511,9 @@
           <a:lstStyle/>
           <a:p>
             <a:r>
-              <a:rPr lang="en-US" smtClean="0"/>
+              <a:rPr lang="en-US"/>
               <a:t>Click to edit Master title style</a:t>
             </a:r>
-            <a:endParaRPr lang="en-US" dirty="0"/>
           </a:p>
         </p:txBody>
       </p:sp>
@@ -4655,38 +4534,37 @@
           <a:p>
             <a:pPr lvl="0"/>
             <a:r>
-              <a:rPr lang="en-US" smtClean="0"/>
-              <a:t>Edit Master text styles</a:t>
+              <a:rPr lang="en-US"/>
+              <a:t>Click to edit Master text styles</a:t>
             </a:r>
           </a:p>
           <a:p>
             <a:pPr lvl="1"/>
             <a:r>
-              <a:rPr lang="en-US" smtClean="0"/>
+              <a:rPr lang="en-US"/>
               <a:t>Second level</a:t>
             </a:r>
           </a:p>
           <a:p>
             <a:pPr lvl="2"/>
             <a:r>
-              <a:rPr lang="en-US" smtClean="0"/>
+              <a:rPr lang="en-US"/>
               <a:t>Third level</a:t>
             </a:r>
           </a:p>
           <a:p>
             <a:pPr lvl="3"/>
             <a:r>
-              <a:rPr lang="en-US" smtClean="0"/>
+              <a:rPr lang="en-US"/>
               <a:t>Fourth level</a:t>
             </a:r>
           </a:p>
           <a:p>
             <a:pPr lvl="4"/>
             <a:r>
-              <a:rPr lang="en-US" smtClean="0"/>
+              <a:rPr lang="en-US"/>
               <a:t>Fifth level</a:t>
             </a:r>
-            <a:endParaRPr lang="en-US" dirty="0"/>
           </a:p>
         </p:txBody>
       </p:sp>
@@ -4707,7 +4585,7 @@
           <a:p>
             <a:fld id="{F1FA7AC5-6045-4418-8E60-F48788734473}" type="datetimeFigureOut">
               <a:rPr lang="en-US" smtClean="0"/>
-              <a:t>4/20/2018</a:t>
+              <a:t>4/12/2018</a:t>
             </a:fld>
             <a:endParaRPr lang="en-US"/>
           </a:p>
@@ -4758,7 +4636,7 @@
     </p:spTree>
     <p:extLst>
       <p:ext uri="{BB962C8B-B14F-4D97-AF65-F5344CB8AC3E}">
-        <p14:creationId xmlns:p14="http://schemas.microsoft.com/office/powerpoint/2010/main" val="1091508751"/>
+        <p14:creationId xmlns:p14="http://schemas.microsoft.com/office/powerpoint/2010/main" val="3386326818"/>
       </p:ext>
     </p:extLst>
   </p:cSld>
@@ -4797,8 +4675,8 @@
         </p:nvSpPr>
         <p:spPr>
           <a:xfrm>
-            <a:off x="623888" y="1709739"/>
-            <a:ext cx="7886700" cy="2852737"/>
+            <a:off x="831850" y="1709738"/>
+            <a:ext cx="10515600" cy="2852737"/>
           </a:xfrm>
         </p:spPr>
         <p:txBody>
@@ -4810,10 +4688,9 @@
           </a:lstStyle>
           <a:p>
             <a:r>
-              <a:rPr lang="en-US" smtClean="0"/>
+              <a:rPr lang="en-US"/>
               <a:t>Click to edit Master title style</a:t>
             </a:r>
-            <a:endParaRPr lang="en-US" dirty="0"/>
           </a:p>
         </p:txBody>
       </p:sp>
@@ -4829,8 +4706,8 @@
         </p:nvSpPr>
         <p:spPr>
           <a:xfrm>
-            <a:off x="623888" y="4589464"/>
-            <a:ext cx="7886700" cy="1500187"/>
+            <a:off x="831850" y="4589463"/>
+            <a:ext cx="10515600" cy="1500187"/>
           </a:xfrm>
         </p:spPr>
         <p:txBody>
@@ -4840,7 +4717,9 @@
               <a:buNone/>
               <a:defRPr sz="2400">
                 <a:solidFill>
-                  <a:schemeClr val="tx1"/>
+                  <a:schemeClr val="tx1">
+                    <a:tint val="75000"/>
+                  </a:schemeClr>
                 </a:solidFill>
               </a:defRPr>
             </a:lvl1pPr>
@@ -4928,8 +4807,8 @@
           <a:p>
             <a:pPr lvl="0"/>
             <a:r>
-              <a:rPr lang="en-US" smtClean="0"/>
-              <a:t>Edit Master text styles</a:t>
+              <a:rPr lang="en-US"/>
+              <a:t>Click to edit Master text styles</a:t>
             </a:r>
           </a:p>
         </p:txBody>
@@ -4951,7 +4830,7 @@
           <a:p>
             <a:fld id="{F1FA7AC5-6045-4418-8E60-F48788734473}" type="datetimeFigureOut">
               <a:rPr lang="en-US" smtClean="0"/>
-              <a:t>4/20/2018</a:t>
+              <a:t>4/12/2018</a:t>
             </a:fld>
             <a:endParaRPr lang="en-US"/>
           </a:p>
@@ -5002,7 +4881,7 @@
     </p:spTree>
     <p:extLst>
       <p:ext uri="{BB962C8B-B14F-4D97-AF65-F5344CB8AC3E}">
-        <p14:creationId xmlns:p14="http://schemas.microsoft.com/office/powerpoint/2010/main" val="887826763"/>
+        <p14:creationId xmlns:p14="http://schemas.microsoft.com/office/powerpoint/2010/main" val="1875206763"/>
       </p:ext>
     </p:extLst>
   </p:cSld>
@@ -5045,10 +4924,9 @@
           <a:lstStyle/>
           <a:p>
             <a:r>
-              <a:rPr lang="en-US" smtClean="0"/>
+              <a:rPr lang="en-US"/>
               <a:t>Click to edit Master title style</a:t>
             </a:r>
-            <a:endParaRPr lang="en-US" dirty="0"/>
           </a:p>
         </p:txBody>
       </p:sp>
@@ -5064,8 +4942,8 @@
         </p:nvSpPr>
         <p:spPr>
           <a:xfrm>
-            <a:off x="628650" y="1825625"/>
-            <a:ext cx="3886200" cy="4351338"/>
+            <a:off x="838200" y="1825625"/>
+            <a:ext cx="5181600" cy="4351338"/>
           </a:xfrm>
         </p:spPr>
         <p:txBody>
@@ -5074,38 +4952,37 @@
           <a:p>
             <a:pPr lvl="0"/>
             <a:r>
-              <a:rPr lang="en-US" smtClean="0"/>
-              <a:t>Edit Master text styles</a:t>
+              <a:rPr lang="en-US"/>
+              <a:t>Click to edit Master text styles</a:t>
             </a:r>
           </a:p>
           <a:p>
             <a:pPr lvl="1"/>
             <a:r>
-              <a:rPr lang="en-US" smtClean="0"/>
+              <a:rPr lang="en-US"/>
               <a:t>Second level</a:t>
             </a:r>
           </a:p>
           <a:p>
             <a:pPr lvl="2"/>
             <a:r>
-              <a:rPr lang="en-US" smtClean="0"/>
+              <a:rPr lang="en-US"/>
               <a:t>Third level</a:t>
             </a:r>
           </a:p>
           <a:p>
             <a:pPr lvl="3"/>
             <a:r>
-              <a:rPr lang="en-US" smtClean="0"/>
+              <a:rPr lang="en-US"/>
               <a:t>Fourth level</a:t>
             </a:r>
           </a:p>
           <a:p>
             <a:pPr lvl="4"/>
             <a:r>
-              <a:rPr lang="en-US" smtClean="0"/>
+              <a:rPr lang="en-US"/>
               <a:t>Fifth level</a:t>
             </a:r>
-            <a:endParaRPr lang="en-US" dirty="0"/>
           </a:p>
         </p:txBody>
       </p:sp>
@@ -5121,8 +4998,8 @@
         </p:nvSpPr>
         <p:spPr>
           <a:xfrm>
-            <a:off x="4629150" y="1825625"/>
-            <a:ext cx="3886200" cy="4351338"/>
+            <a:off x="6172200" y="1825625"/>
+            <a:ext cx="5181600" cy="4351338"/>
           </a:xfrm>
         </p:spPr>
         <p:txBody>
@@ -5131,38 +5008,37 @@
           <a:p>
             <a:pPr lvl="0"/>
             <a:r>
-              <a:rPr lang="en-US" smtClean="0"/>
-              <a:t>Edit Master text styles</a:t>
+              <a:rPr lang="en-US"/>
+              <a:t>Click to edit Master text styles</a:t>
             </a:r>
           </a:p>
           <a:p>
             <a:pPr lvl="1"/>
             <a:r>
-              <a:rPr lang="en-US" smtClean="0"/>
+              <a:rPr lang="en-US"/>
               <a:t>Second level</a:t>
             </a:r>
           </a:p>
           <a:p>
             <a:pPr lvl="2"/>
             <a:r>
-              <a:rPr lang="en-US" smtClean="0"/>
+              <a:rPr lang="en-US"/>
               <a:t>Third level</a:t>
             </a:r>
           </a:p>
           <a:p>
             <a:pPr lvl="3"/>
             <a:r>
-              <a:rPr lang="en-US" smtClean="0"/>
+              <a:rPr lang="en-US"/>
               <a:t>Fourth level</a:t>
             </a:r>
           </a:p>
           <a:p>
             <a:pPr lvl="4"/>
             <a:r>
-              <a:rPr lang="en-US" smtClean="0"/>
+              <a:rPr lang="en-US"/>
               <a:t>Fifth level</a:t>
             </a:r>
-            <a:endParaRPr lang="en-US" dirty="0"/>
           </a:p>
         </p:txBody>
       </p:sp>
@@ -5183,7 +5059,7 @@
           <a:p>
             <a:fld id="{F1FA7AC5-6045-4418-8E60-F48788734473}" type="datetimeFigureOut">
               <a:rPr lang="en-US" smtClean="0"/>
-              <a:t>4/20/2018</a:t>
+              <a:t>4/12/2018</a:t>
             </a:fld>
             <a:endParaRPr lang="en-US"/>
           </a:p>
@@ -5234,7 +5110,7 @@
     </p:spTree>
     <p:extLst>
       <p:ext uri="{BB962C8B-B14F-4D97-AF65-F5344CB8AC3E}">
-        <p14:creationId xmlns:p14="http://schemas.microsoft.com/office/powerpoint/2010/main" val="2790650700"/>
+        <p14:creationId xmlns:p14="http://schemas.microsoft.com/office/powerpoint/2010/main" val="3401293223"/>
       </p:ext>
     </p:extLst>
   </p:cSld>
@@ -5273,8 +5149,8 @@
         </p:nvSpPr>
         <p:spPr>
           <a:xfrm>
-            <a:off x="629841" y="365126"/>
-            <a:ext cx="7886700" cy="1325563"/>
+            <a:off x="839788" y="365125"/>
+            <a:ext cx="10515600" cy="1325563"/>
           </a:xfrm>
         </p:spPr>
         <p:txBody>
@@ -5282,10 +5158,9 @@
           <a:lstStyle/>
           <a:p>
             <a:r>
-              <a:rPr lang="en-US" smtClean="0"/>
+              <a:rPr lang="en-US"/>
               <a:t>Click to edit Master title style</a:t>
             </a:r>
-            <a:endParaRPr lang="en-US" dirty="0"/>
           </a:p>
         </p:txBody>
       </p:sp>
@@ -5301,8 +5176,8 @@
         </p:nvSpPr>
         <p:spPr>
           <a:xfrm>
-            <a:off x="629842" y="1681163"/>
-            <a:ext cx="3868340" cy="823912"/>
+            <a:off x="839788" y="1681163"/>
+            <a:ext cx="5157787" cy="823912"/>
           </a:xfrm>
         </p:spPr>
         <p:txBody>
@@ -5348,8 +5223,8 @@
           <a:p>
             <a:pPr lvl="0"/>
             <a:r>
-              <a:rPr lang="en-US" smtClean="0"/>
-              <a:t>Edit Master text styles</a:t>
+              <a:rPr lang="en-US"/>
+              <a:t>Click to edit Master text styles</a:t>
             </a:r>
           </a:p>
         </p:txBody>
@@ -5366,8 +5241,8 @@
         </p:nvSpPr>
         <p:spPr>
           <a:xfrm>
-            <a:off x="629842" y="2505075"/>
-            <a:ext cx="3868340" cy="3684588"/>
+            <a:off x="839788" y="2505075"/>
+            <a:ext cx="5157787" cy="3684588"/>
           </a:xfrm>
         </p:spPr>
         <p:txBody>
@@ -5376,38 +5251,37 @@
           <a:p>
             <a:pPr lvl="0"/>
             <a:r>
-              <a:rPr lang="en-US" smtClean="0"/>
-              <a:t>Edit Master text styles</a:t>
+              <a:rPr lang="en-US"/>
+              <a:t>Click to edit Master text styles</a:t>
             </a:r>
           </a:p>
           <a:p>
             <a:pPr lvl="1"/>
             <a:r>
-              <a:rPr lang="en-US" smtClean="0"/>
+              <a:rPr lang="en-US"/>
               <a:t>Second level</a:t>
             </a:r>
           </a:p>
           <a:p>
             <a:pPr lvl="2"/>
             <a:r>
-              <a:rPr lang="en-US" smtClean="0"/>
+              <a:rPr lang="en-US"/>
               <a:t>Third level</a:t>
             </a:r>
           </a:p>
           <a:p>
             <a:pPr lvl="3"/>
             <a:r>
-              <a:rPr lang="en-US" smtClean="0"/>
+              <a:rPr lang="en-US"/>
               <a:t>Fourth level</a:t>
             </a:r>
           </a:p>
           <a:p>
             <a:pPr lvl="4"/>
             <a:r>
-              <a:rPr lang="en-US" smtClean="0"/>
+              <a:rPr lang="en-US"/>
               <a:t>Fifth level</a:t>
             </a:r>
-            <a:endParaRPr lang="en-US" dirty="0"/>
           </a:p>
         </p:txBody>
       </p:sp>
@@ -5423,8 +5297,8 @@
         </p:nvSpPr>
         <p:spPr>
           <a:xfrm>
-            <a:off x="4629150" y="1681163"/>
-            <a:ext cx="3887391" cy="823912"/>
+            <a:off x="6172200" y="1681163"/>
+            <a:ext cx="5183188" cy="823912"/>
           </a:xfrm>
         </p:spPr>
         <p:txBody>
@@ -5470,8 +5344,8 @@
           <a:p>
             <a:pPr lvl="0"/>
             <a:r>
-              <a:rPr lang="en-US" smtClean="0"/>
-              <a:t>Edit Master text styles</a:t>
+              <a:rPr lang="en-US"/>
+              <a:t>Click to edit Master text styles</a:t>
             </a:r>
           </a:p>
         </p:txBody>
@@ -5488,8 +5362,8 @@
         </p:nvSpPr>
         <p:spPr>
           <a:xfrm>
-            <a:off x="4629150" y="2505075"/>
-            <a:ext cx="3887391" cy="3684588"/>
+            <a:off x="6172200" y="2505075"/>
+            <a:ext cx="5183188" cy="3684588"/>
           </a:xfrm>
         </p:spPr>
         <p:txBody>
@@ -5498,38 +5372,37 @@
           <a:p>
             <a:pPr lvl="0"/>
             <a:r>
-              <a:rPr lang="en-US" smtClean="0"/>
-              <a:t>Edit Master text styles</a:t>
+              <a:rPr lang="en-US"/>
+              <a:t>Click to edit Master text styles</a:t>
             </a:r>
           </a:p>
           <a:p>
             <a:pPr lvl="1"/>
             <a:r>
-              <a:rPr lang="en-US" smtClean="0"/>
+              <a:rPr lang="en-US"/>
               <a:t>Second level</a:t>
             </a:r>
           </a:p>
           <a:p>
             <a:pPr lvl="2"/>
             <a:r>
-              <a:rPr lang="en-US" smtClean="0"/>
+              <a:rPr lang="en-US"/>
               <a:t>Third level</a:t>
             </a:r>
           </a:p>
           <a:p>
             <a:pPr lvl="3"/>
             <a:r>
-              <a:rPr lang="en-US" smtClean="0"/>
+              <a:rPr lang="en-US"/>
               <a:t>Fourth level</a:t>
             </a:r>
           </a:p>
           <a:p>
             <a:pPr lvl="4"/>
             <a:r>
-              <a:rPr lang="en-US" smtClean="0"/>
+              <a:rPr lang="en-US"/>
               <a:t>Fifth level</a:t>
             </a:r>
-            <a:endParaRPr lang="en-US" dirty="0"/>
           </a:p>
         </p:txBody>
       </p:sp>
@@ -5550,7 +5423,7 @@
           <a:p>
             <a:fld id="{F1FA7AC5-6045-4418-8E60-F48788734473}" type="datetimeFigureOut">
               <a:rPr lang="en-US" smtClean="0"/>
-              <a:t>4/20/2018</a:t>
+              <a:t>4/12/2018</a:t>
             </a:fld>
             <a:endParaRPr lang="en-US"/>
           </a:p>
@@ -5601,7 +5474,7 @@
     </p:spTree>
     <p:extLst>
       <p:ext uri="{BB962C8B-B14F-4D97-AF65-F5344CB8AC3E}">
-        <p14:creationId xmlns:p14="http://schemas.microsoft.com/office/powerpoint/2010/main" val="581926899"/>
+        <p14:creationId xmlns:p14="http://schemas.microsoft.com/office/powerpoint/2010/main" val="3056490410"/>
       </p:ext>
     </p:extLst>
   </p:cSld>
@@ -5644,10 +5517,9 @@
           <a:lstStyle/>
           <a:p>
             <a:r>
-              <a:rPr lang="en-US" smtClean="0"/>
+              <a:rPr lang="en-US"/>
               <a:t>Click to edit Master title style</a:t>
             </a:r>
-            <a:endParaRPr lang="en-US" dirty="0"/>
           </a:p>
         </p:txBody>
       </p:sp>
@@ -5668,7 +5540,7 @@
           <a:p>
             <a:fld id="{F1FA7AC5-6045-4418-8E60-F48788734473}" type="datetimeFigureOut">
               <a:rPr lang="en-US" smtClean="0"/>
-              <a:t>4/20/2018</a:t>
+              <a:t>4/12/2018</a:t>
             </a:fld>
             <a:endParaRPr lang="en-US"/>
           </a:p>
@@ -5719,7 +5591,7 @@
     </p:spTree>
     <p:extLst>
       <p:ext uri="{BB962C8B-B14F-4D97-AF65-F5344CB8AC3E}">
-        <p14:creationId xmlns:p14="http://schemas.microsoft.com/office/powerpoint/2010/main" val="1140105674"/>
+        <p14:creationId xmlns:p14="http://schemas.microsoft.com/office/powerpoint/2010/main" val="3573976379"/>
       </p:ext>
     </p:extLst>
   </p:cSld>
@@ -5763,7 +5635,7 @@
           <a:p>
             <a:fld id="{F1FA7AC5-6045-4418-8E60-F48788734473}" type="datetimeFigureOut">
               <a:rPr lang="en-US" smtClean="0"/>
-              <a:t>4/20/2018</a:t>
+              <a:t>4/12/2018</a:t>
             </a:fld>
             <a:endParaRPr lang="en-US"/>
           </a:p>
@@ -5814,7 +5686,7 @@
     </p:spTree>
     <p:extLst>
       <p:ext uri="{BB962C8B-B14F-4D97-AF65-F5344CB8AC3E}">
-        <p14:creationId xmlns:p14="http://schemas.microsoft.com/office/powerpoint/2010/main" val="2300657527"/>
+        <p14:creationId xmlns:p14="http://schemas.microsoft.com/office/powerpoint/2010/main" val="3201795056"/>
       </p:ext>
     </p:extLst>
   </p:cSld>
@@ -5853,8 +5725,8 @@
         </p:nvSpPr>
         <p:spPr>
           <a:xfrm>
-            <a:off x="629841" y="457200"/>
-            <a:ext cx="2949178" cy="1600200"/>
+            <a:off x="839788" y="457200"/>
+            <a:ext cx="3932237" cy="1600200"/>
           </a:xfrm>
         </p:spPr>
         <p:txBody>
@@ -5866,10 +5738,9 @@
           </a:lstStyle>
           <a:p>
             <a:r>
-              <a:rPr lang="en-US" smtClean="0"/>
+              <a:rPr lang="en-US"/>
               <a:t>Click to edit Master title style</a:t>
             </a:r>
-            <a:endParaRPr lang="en-US" dirty="0"/>
           </a:p>
         </p:txBody>
       </p:sp>
@@ -5885,8 +5756,8 @@
         </p:nvSpPr>
         <p:spPr>
           <a:xfrm>
-            <a:off x="3887391" y="987426"/>
-            <a:ext cx="4629150" cy="4873625"/>
+            <a:off x="5183188" y="987425"/>
+            <a:ext cx="6172200" cy="4873625"/>
           </a:xfrm>
         </p:spPr>
         <p:txBody>
@@ -5923,38 +5794,37 @@
           <a:p>
             <a:pPr lvl="0"/>
             <a:r>
-              <a:rPr lang="en-US" smtClean="0"/>
-              <a:t>Edit Master text styles</a:t>
+              <a:rPr lang="en-US"/>
+              <a:t>Click to edit Master text styles</a:t>
             </a:r>
           </a:p>
           <a:p>
             <a:pPr lvl="1"/>
             <a:r>
-              <a:rPr lang="en-US" smtClean="0"/>
+              <a:rPr lang="en-US"/>
               <a:t>Second level</a:t>
             </a:r>
           </a:p>
           <a:p>
             <a:pPr lvl="2"/>
             <a:r>
-              <a:rPr lang="en-US" smtClean="0"/>
+              <a:rPr lang="en-US"/>
               <a:t>Third level</a:t>
             </a:r>
           </a:p>
           <a:p>
             <a:pPr lvl="3"/>
             <a:r>
-              <a:rPr lang="en-US" smtClean="0"/>
+              <a:rPr lang="en-US"/>
               <a:t>Fourth level</a:t>
             </a:r>
           </a:p>
           <a:p>
             <a:pPr lvl="4"/>
             <a:r>
-              <a:rPr lang="en-US" smtClean="0"/>
+              <a:rPr lang="en-US"/>
               <a:t>Fifth level</a:t>
             </a:r>
-            <a:endParaRPr lang="en-US" dirty="0"/>
           </a:p>
         </p:txBody>
       </p:sp>
@@ -5970,8 +5840,8 @@
         </p:nvSpPr>
         <p:spPr>
           <a:xfrm>
-            <a:off x="629841" y="2057400"/>
-            <a:ext cx="2949178" cy="3811588"/>
+            <a:off x="839788" y="2057400"/>
+            <a:ext cx="3932237" cy="3811588"/>
           </a:xfrm>
         </p:spPr>
         <p:txBody>
@@ -6017,8 +5887,8 @@
           <a:p>
             <a:pPr lvl="0"/>
             <a:r>
-              <a:rPr lang="en-US" smtClean="0"/>
-              <a:t>Edit Master text styles</a:t>
+              <a:rPr lang="en-US"/>
+              <a:t>Click to edit Master text styles</a:t>
             </a:r>
           </a:p>
         </p:txBody>
@@ -6040,7 +5910,7 @@
           <a:p>
             <a:fld id="{F1FA7AC5-6045-4418-8E60-F48788734473}" type="datetimeFigureOut">
               <a:rPr lang="en-US" smtClean="0"/>
-              <a:t>4/20/2018</a:t>
+              <a:t>4/12/2018</a:t>
             </a:fld>
             <a:endParaRPr lang="en-US"/>
           </a:p>
@@ -6091,7 +5961,7 @@
     </p:spTree>
     <p:extLst>
       <p:ext uri="{BB962C8B-B14F-4D97-AF65-F5344CB8AC3E}">
-        <p14:creationId xmlns:p14="http://schemas.microsoft.com/office/powerpoint/2010/main" val="30909051"/>
+        <p14:creationId xmlns:p14="http://schemas.microsoft.com/office/powerpoint/2010/main" val="2526201297"/>
       </p:ext>
     </p:extLst>
   </p:cSld>
@@ -6130,8 +6000,8 @@
         </p:nvSpPr>
         <p:spPr>
           <a:xfrm>
-            <a:off x="629841" y="457200"/>
-            <a:ext cx="2949178" cy="1600200"/>
+            <a:off x="839788" y="457200"/>
+            <a:ext cx="3932237" cy="1600200"/>
           </a:xfrm>
         </p:spPr>
         <p:txBody>
@@ -6143,10 +6013,9 @@
           </a:lstStyle>
           <a:p>
             <a:r>
-              <a:rPr lang="en-US" smtClean="0"/>
+              <a:rPr lang="en-US"/>
               <a:t>Click to edit Master title style</a:t>
             </a:r>
-            <a:endParaRPr lang="en-US" dirty="0"/>
           </a:p>
         </p:txBody>
       </p:sp>
@@ -6154,7 +6023,7 @@
         <p:nvSpPr>
           <p:cNvPr id="3" name="Picture Placeholder 2"/>
           <p:cNvSpPr>
-            <a:spLocks noGrp="1" noChangeAspect="1"/>
+            <a:spLocks noGrp="1"/>
           </p:cNvSpPr>
           <p:nvPr>
             <p:ph type="pic" idx="1"/>
@@ -6162,12 +6031,12 @@
         </p:nvSpPr>
         <p:spPr>
           <a:xfrm>
-            <a:off x="3887391" y="987426"/>
-            <a:ext cx="4629150" cy="4873625"/>
+            <a:off x="5183188" y="987425"/>
+            <a:ext cx="6172200" cy="4873625"/>
           </a:xfrm>
         </p:spPr>
         <p:txBody>
-          <a:bodyPr anchor="t"/>
+          <a:bodyPr/>
           <a:lstStyle>
             <a:lvl1pPr marL="0" indent="0">
               <a:buNone/>
@@ -6207,11 +6076,7 @@
             </a:lvl9pPr>
           </a:lstStyle>
           <a:p>
-            <a:r>
-              <a:rPr lang="en-US" smtClean="0"/>
-              <a:t>Click icon to add picture</a:t>
-            </a:r>
-            <a:endParaRPr lang="en-US" dirty="0"/>
+            <a:endParaRPr lang="en-US"/>
           </a:p>
         </p:txBody>
       </p:sp>
@@ -6227,8 +6092,8 @@
         </p:nvSpPr>
         <p:spPr>
           <a:xfrm>
-            <a:off x="629841" y="2057400"/>
-            <a:ext cx="2949178" cy="3811588"/>
+            <a:off x="839788" y="2057400"/>
+            <a:ext cx="3932237" cy="3811588"/>
           </a:xfrm>
         </p:spPr>
         <p:txBody>
@@ -6274,8 +6139,8 @@
           <a:p>
             <a:pPr lvl="0"/>
             <a:r>
-              <a:rPr lang="en-US" smtClean="0"/>
-              <a:t>Edit Master text styles</a:t>
+              <a:rPr lang="en-US"/>
+              <a:t>Click to edit Master text styles</a:t>
             </a:r>
           </a:p>
         </p:txBody>
@@ -6297,7 +6162,7 @@
           <a:p>
             <a:fld id="{F1FA7AC5-6045-4418-8E60-F48788734473}" type="datetimeFigureOut">
               <a:rPr lang="en-US" smtClean="0"/>
-              <a:t>4/20/2018</a:t>
+              <a:t>4/12/2018</a:t>
             </a:fld>
             <a:endParaRPr lang="en-US"/>
           </a:p>
@@ -6348,7 +6213,7 @@
     </p:spTree>
     <p:extLst>
       <p:ext uri="{BB962C8B-B14F-4D97-AF65-F5344CB8AC3E}">
-        <p14:creationId xmlns:p14="http://schemas.microsoft.com/office/powerpoint/2010/main" val="922028734"/>
+        <p14:creationId xmlns:p14="http://schemas.microsoft.com/office/powerpoint/2010/main" val="242868210"/>
       </p:ext>
     </p:extLst>
   </p:cSld>
@@ -6363,38 +6228,16 @@
   <p:cSld>
     <p:bg>
       <p:bgPr>
-        <a:gradFill flip="none" rotWithShape="1">
-          <a:gsLst>
-            <a:gs pos="0">
-              <a:schemeClr val="accent3">
-                <a:lumMod val="5000"/>
-                <a:lumOff val="95000"/>
-              </a:schemeClr>
-            </a:gs>
-            <a:gs pos="74000">
-              <a:schemeClr val="accent3">
-                <a:lumMod val="45000"/>
-                <a:lumOff val="55000"/>
-              </a:schemeClr>
-            </a:gs>
-            <a:gs pos="83000">
-              <a:schemeClr val="accent3">
-                <a:lumMod val="45000"/>
-                <a:lumOff val="55000"/>
-              </a:schemeClr>
-            </a:gs>
-            <a:gs pos="100000">
-              <a:schemeClr val="accent3">
-                <a:lumMod val="30000"/>
-                <a:lumOff val="70000"/>
-              </a:schemeClr>
-            </a:gs>
-          </a:gsLst>
-          <a:path path="circle">
-            <a:fillToRect l="50000" t="50000" r="50000" b="50000"/>
-          </a:path>
-          <a:tileRect/>
-        </a:gradFill>
+        <a:blipFill dpi="0" rotWithShape="1">
+          <a:blip r:embed="rId13">
+            <a:alphaModFix amt="15000"/>
+            <a:lum/>
+          </a:blip>
+          <a:srcRect/>
+          <a:stretch>
+            <a:fillRect t="-9000" b="-9000"/>
+          </a:stretch>
+        </a:blipFill>
         <a:effectLst/>
       </p:bgPr>
     </p:bg>
@@ -6424,8 +6267,8 @@
         </p:nvSpPr>
         <p:spPr>
           <a:xfrm>
-            <a:off x="628650" y="365126"/>
-            <a:ext cx="7886700" cy="1325563"/>
+            <a:off x="838200" y="365125"/>
+            <a:ext cx="10515600" cy="1325563"/>
           </a:xfrm>
           <a:prstGeom prst="rect">
             <a:avLst/>
@@ -6438,10 +6281,9 @@
           <a:lstStyle/>
           <a:p>
             <a:r>
-              <a:rPr lang="en-US" smtClean="0"/>
+              <a:rPr lang="en-US"/>
               <a:t>Click to edit Master title style</a:t>
             </a:r>
-            <a:endParaRPr lang="en-US" dirty="0"/>
           </a:p>
         </p:txBody>
       </p:sp>
@@ -6457,8 +6299,8 @@
         </p:nvSpPr>
         <p:spPr>
           <a:xfrm>
-            <a:off x="628650" y="1825625"/>
-            <a:ext cx="7886700" cy="4351338"/>
+            <a:off x="838200" y="1825625"/>
+            <a:ext cx="10515600" cy="4351338"/>
           </a:xfrm>
           <a:prstGeom prst="rect">
             <a:avLst/>
@@ -6472,38 +6314,37 @@
           <a:p>
             <a:pPr lvl="0"/>
             <a:r>
-              <a:rPr lang="en-US" smtClean="0"/>
-              <a:t>Edit Master text styles</a:t>
+              <a:rPr lang="en-US"/>
+              <a:t>Click to edit Master text styles</a:t>
             </a:r>
           </a:p>
           <a:p>
             <a:pPr lvl="1"/>
             <a:r>
-              <a:rPr lang="en-US" smtClean="0"/>
+              <a:rPr lang="en-US"/>
               <a:t>Second level</a:t>
             </a:r>
           </a:p>
           <a:p>
             <a:pPr lvl="2"/>
             <a:r>
-              <a:rPr lang="en-US" smtClean="0"/>
+              <a:rPr lang="en-US"/>
               <a:t>Third level</a:t>
             </a:r>
           </a:p>
           <a:p>
             <a:pPr lvl="3"/>
             <a:r>
-              <a:rPr lang="en-US" smtClean="0"/>
+              <a:rPr lang="en-US"/>
               <a:t>Fourth level</a:t>
             </a:r>
           </a:p>
           <a:p>
             <a:pPr lvl="4"/>
             <a:r>
-              <a:rPr lang="en-US" smtClean="0"/>
+              <a:rPr lang="en-US"/>
               <a:t>Fifth level</a:t>
             </a:r>
-            <a:endParaRPr lang="en-US" dirty="0"/>
           </a:p>
         </p:txBody>
       </p:sp>
@@ -6519,8 +6360,8 @@
         </p:nvSpPr>
         <p:spPr>
           <a:xfrm>
-            <a:off x="628650" y="6356351"/>
-            <a:ext cx="2057400" cy="365125"/>
+            <a:off x="838200" y="6356350"/>
+            <a:ext cx="2743200" cy="365125"/>
           </a:xfrm>
           <a:prstGeom prst="rect">
             <a:avLst/>
@@ -6542,7 +6383,7 @@
           <a:p>
             <a:fld id="{F1FA7AC5-6045-4418-8E60-F48788734473}" type="datetimeFigureOut">
               <a:rPr lang="en-US" smtClean="0"/>
-              <a:t>4/20/2018</a:t>
+              <a:t>4/12/2018</a:t>
             </a:fld>
             <a:endParaRPr lang="en-US"/>
           </a:p>
@@ -6560,8 +6401,8 @@
         </p:nvSpPr>
         <p:spPr>
           <a:xfrm>
-            <a:off x="3028950" y="6356351"/>
-            <a:ext cx="3086100" cy="365125"/>
+            <a:off x="4038600" y="6356350"/>
+            <a:ext cx="4114800" cy="365125"/>
           </a:xfrm>
           <a:prstGeom prst="rect">
             <a:avLst/>
@@ -6597,8 +6438,8 @@
         </p:nvSpPr>
         <p:spPr>
           <a:xfrm>
-            <a:off x="6457950" y="6356351"/>
-            <a:ext cx="2057400" cy="365125"/>
+            <a:off x="8610600" y="6356350"/>
+            <a:ext cx="2743200" cy="365125"/>
           </a:xfrm>
           <a:prstGeom prst="rect">
             <a:avLst/>
@@ -6629,23 +6470,23 @@
     </p:spTree>
     <p:extLst>
       <p:ext uri="{BB962C8B-B14F-4D97-AF65-F5344CB8AC3E}">
-        <p14:creationId xmlns:p14="http://schemas.microsoft.com/office/powerpoint/2010/main" val="1233389215"/>
+        <p14:creationId xmlns:p14="http://schemas.microsoft.com/office/powerpoint/2010/main" val="3931132979"/>
       </p:ext>
     </p:extLst>
   </p:cSld>
   <p:clrMap bg1="lt1" tx1="dk1" bg2="lt2" tx2="dk2" accent1="accent1" accent2="accent2" accent3="accent3" accent4="accent4" accent5="accent5" accent6="accent6" hlink="hlink" folHlink="folHlink"/>
   <p:sldLayoutIdLst>
-    <p:sldLayoutId id="2147483661" r:id="rId1"/>
-    <p:sldLayoutId id="2147483662" r:id="rId2"/>
-    <p:sldLayoutId id="2147483663" r:id="rId3"/>
-    <p:sldLayoutId id="2147483664" r:id="rId4"/>
-    <p:sldLayoutId id="2147483665" r:id="rId5"/>
-    <p:sldLayoutId id="2147483666" r:id="rId6"/>
-    <p:sldLayoutId id="2147483667" r:id="rId7"/>
-    <p:sldLayoutId id="2147483668" r:id="rId8"/>
-    <p:sldLayoutId id="2147483669" r:id="rId9"/>
-    <p:sldLayoutId id="2147483670" r:id="rId10"/>
-    <p:sldLayoutId id="2147483671" r:id="rId11"/>
+    <p:sldLayoutId id="2147483649" r:id="rId1"/>
+    <p:sldLayoutId id="2147483650" r:id="rId2"/>
+    <p:sldLayoutId id="2147483651" r:id="rId3"/>
+    <p:sldLayoutId id="2147483652" r:id="rId4"/>
+    <p:sldLayoutId id="2147483653" r:id="rId5"/>
+    <p:sldLayoutId id="2147483654" r:id="rId6"/>
+    <p:sldLayoutId id="2147483655" r:id="rId7"/>
+    <p:sldLayoutId id="2147483656" r:id="rId8"/>
+    <p:sldLayoutId id="2147483657" r:id="rId9"/>
+    <p:sldLayoutId id="2147483658" r:id="rId10"/>
+    <p:sldLayoutId id="2147483659" r:id="rId11"/>
   </p:sldLayoutIdLst>
   <p:txStyles>
     <p:titleStyle>
@@ -6959,8 +6800,8 @@
         </p:nvSpPr>
         <p:spPr>
           <a:xfrm>
-            <a:off x="427705" y="1612013"/>
-            <a:ext cx="8288594" cy="734827"/>
+            <a:off x="570271" y="1006346"/>
+            <a:ext cx="11051458" cy="979769"/>
           </a:xfrm>
         </p:spPr>
         <p:txBody>
@@ -6991,19 +6832,19 @@
         </p:nvSpPr>
         <p:spPr>
           <a:xfrm>
-            <a:off x="427704" y="3890254"/>
-            <a:ext cx="7854650" cy="1946960"/>
+            <a:off x="570270" y="4044005"/>
+            <a:ext cx="10472867" cy="2595946"/>
           </a:xfrm>
         </p:spPr>
         <p:txBody>
-          <a:bodyPr vert="horz" lIns="68580" tIns="34290" rIns="68580" bIns="34290" rtlCol="0" anchor="t">
-            <a:normAutofit fontScale="92500" lnSpcReduction="10000"/>
+          <a:bodyPr vert="horz" lIns="91440" tIns="45720" rIns="91440" bIns="45720" rtlCol="0" anchor="t">
+            <a:normAutofit/>
           </a:bodyPr>
           <a:lstStyle/>
           <a:p>
             <a:pPr algn="l"/>
             <a:r>
-              <a:rPr lang="en-US" sz="2100" dirty="0">
+              <a:rPr lang="en-US" sz="2800" dirty="0">
                 <a:cs typeface="Calibri"/>
               </a:rPr>
               <a:t>Dustin Ewers</a:t>
@@ -7068,13 +6909,6 @@
   <p:clrMapOvr>
     <a:masterClrMapping/>
   </p:clrMapOvr>
-  <p:timing>
-    <p:tnLst>
-      <p:par>
-        <p:cTn id="1" dur="indefinite" restart="never" nodeType="tmRoot"/>
-      </p:par>
-    </p:tnLst>
-  </p:timing>
 </p:sld>
 </file>
 
@@ -7113,8 +6947,8 @@
         </p:nvSpPr>
         <p:spPr>
           <a:xfrm>
-            <a:off x="628650" y="1131097"/>
-            <a:ext cx="7886700" cy="778289"/>
+            <a:off x="838200" y="365126"/>
+            <a:ext cx="10515600" cy="1037718"/>
           </a:xfrm>
         </p:spPr>
         <p:txBody>
@@ -7143,8 +6977,8 @@
         </p:nvSpPr>
         <p:spPr>
           <a:xfrm>
-            <a:off x="2235402" y="1909384"/>
-            <a:ext cx="4673200" cy="3039236"/>
+            <a:off x="2980533" y="1402843"/>
+            <a:ext cx="6230933" cy="4052314"/>
           </a:xfrm>
           <a:prstGeom prst="rect">
             <a:avLst/>
@@ -7171,7 +7005,7 @@
           <a:lstStyle/>
           <a:p>
             <a:pPr algn="ctr"/>
-            <a:endParaRPr lang="en-US" sz="1350"/>
+            <a:endParaRPr lang="en-US"/>
           </a:p>
         </p:txBody>
       </p:sp>
@@ -7189,8 +7023,8 @@
         </p:nvSpPr>
         <p:spPr>
           <a:xfrm>
-            <a:off x="2690617" y="3878373"/>
-            <a:ext cx="3852401" cy="576343"/>
+            <a:off x="3587486" y="4028160"/>
+            <a:ext cx="5136534" cy="768457"/>
           </a:xfrm>
           <a:prstGeom prst="rect">
             <a:avLst/>
@@ -7222,7 +7056,7 @@
           <a:lstStyle/>
           <a:p>
             <a:pPr algn="ctr"/>
-            <a:endParaRPr lang="en-US" sz="1350"/>
+            <a:endParaRPr lang="en-US"/>
           </a:p>
         </p:txBody>
       </p:sp>
@@ -7240,8 +7074,8 @@
         </p:nvSpPr>
         <p:spPr>
           <a:xfrm>
-            <a:off x="2690617" y="3098870"/>
-            <a:ext cx="3852401" cy="576343"/>
+            <a:off x="3587486" y="2988822"/>
+            <a:ext cx="5136534" cy="768457"/>
           </a:xfrm>
           <a:prstGeom prst="rect">
             <a:avLst/>
@@ -7273,7 +7107,7 @@
           <a:lstStyle/>
           <a:p>
             <a:pPr algn="ctr"/>
-            <a:endParaRPr lang="en-US" sz="1350"/>
+            <a:endParaRPr lang="en-US"/>
           </a:p>
         </p:txBody>
       </p:sp>
@@ -7291,8 +7125,8 @@
         </p:nvSpPr>
         <p:spPr>
           <a:xfrm>
-            <a:off x="2690617" y="2319366"/>
-            <a:ext cx="3852401" cy="576343"/>
+            <a:off x="3587486" y="1949484"/>
+            <a:ext cx="5136534" cy="768457"/>
           </a:xfrm>
           <a:prstGeom prst="rect">
             <a:avLst/>
@@ -7324,7 +7158,7 @@
           <a:lstStyle/>
           <a:p>
             <a:pPr algn="ctr"/>
-            <a:endParaRPr lang="en-US" sz="1350" dirty="0"/>
+            <a:endParaRPr lang="en-US" dirty="0"/>
           </a:p>
         </p:txBody>
       </p:sp>
@@ -7338,13 +7172,6 @@
   <p:clrMapOvr>
     <a:masterClrMapping/>
   </p:clrMapOvr>
-  <p:timing>
-    <p:tnLst>
-      <p:par>
-        <p:cTn id="1" dur="indefinite" restart="never" nodeType="tmRoot"/>
-      </p:par>
-    </p:tnLst>
-  </p:timing>
 </p:sld>
 </file>
 
@@ -7383,8 +7210,8 @@
         </p:nvSpPr>
         <p:spPr>
           <a:xfrm>
-            <a:off x="628650" y="2931916"/>
-            <a:ext cx="7886700" cy="994172"/>
+            <a:off x="838200" y="2766218"/>
+            <a:ext cx="10515600" cy="1325563"/>
           </a:xfrm>
         </p:spPr>
         <p:txBody>
@@ -7409,13 +7236,6 @@
   <p:clrMapOvr>
     <a:masterClrMapping/>
   </p:clrMapOvr>
-  <p:timing>
-    <p:tnLst>
-      <p:par>
-        <p:cTn id="1" dur="indefinite" restart="never" nodeType="tmRoot"/>
-      </p:par>
-    </p:tnLst>
-  </p:timing>
 </p:sld>
 </file>
 
@@ -7454,8 +7274,8 @@
         </p:nvSpPr>
         <p:spPr>
           <a:xfrm>
-            <a:off x="628650" y="2931916"/>
-            <a:ext cx="7886700" cy="994172"/>
+            <a:off x="838200" y="2766218"/>
+            <a:ext cx="10515600" cy="1325563"/>
           </a:xfrm>
         </p:spPr>
         <p:txBody>
@@ -7480,13 +7300,6 @@
   <p:clrMapOvr>
     <a:masterClrMapping/>
   </p:clrMapOvr>
-  <p:timing>
-    <p:tnLst>
-      <p:par>
-        <p:cTn id="1" dur="indefinite" restart="never" nodeType="tmRoot"/>
-      </p:par>
-    </p:tnLst>
-  </p:timing>
 </p:sld>
 </file>
 
@@ -7558,8 +7371,8 @@
         </p:blipFill>
         <p:spPr>
           <a:xfrm>
-            <a:off x="196869" y="2125268"/>
-            <a:ext cx="8750262" cy="3298874"/>
+            <a:off x="262492" y="1690688"/>
+            <a:ext cx="11667016" cy="4398498"/>
           </a:xfrm>
           <a:prstGeom prst="rect">
             <a:avLst/>
@@ -7576,13 +7389,6 @@
   <p:clrMapOvr>
     <a:masterClrMapping/>
   </p:clrMapOvr>
-  <p:timing>
-    <p:tnLst>
-      <p:par>
-        <p:cTn id="1" dur="indefinite" restart="never" nodeType="tmRoot"/>
-      </p:par>
-    </p:tnLst>
-  </p:timing>
 </p:sld>
 </file>
 
@@ -7621,8 +7427,8 @@
         </p:nvSpPr>
         <p:spPr>
           <a:xfrm>
-            <a:off x="628650" y="2931916"/>
-            <a:ext cx="7886700" cy="994172"/>
+            <a:off x="838200" y="2766218"/>
+            <a:ext cx="10515600" cy="1325563"/>
           </a:xfrm>
         </p:spPr>
         <p:txBody>
@@ -7647,13 +7453,6 @@
   <p:clrMapOvr>
     <a:masterClrMapping/>
   </p:clrMapOvr>
-  <p:timing>
-    <p:tnLst>
-      <p:par>
-        <p:cTn id="1" dur="indefinite" restart="never" nodeType="tmRoot"/>
-      </p:par>
-    </p:tnLst>
-  </p:timing>
 </p:sld>
 </file>
 
@@ -7692,8 +7491,8 @@
         </p:nvSpPr>
         <p:spPr>
           <a:xfrm>
-            <a:off x="628650" y="2931916"/>
-            <a:ext cx="7886700" cy="994172"/>
+            <a:off x="838200" y="2766218"/>
+            <a:ext cx="10515600" cy="1325563"/>
           </a:xfrm>
         </p:spPr>
         <p:txBody>
@@ -7702,7 +7501,7 @@
           <a:p>
             <a:pPr algn="ctr"/>
             <a:r>
-              <a:rPr lang="en-US" sz="5400" dirty="0"/>
+              <a:rPr lang="en-US" sz="7200" dirty="0"/>
               <a:t>Demos</a:t>
             </a:r>
             <a:endParaRPr lang="en-US" dirty="0"/>
@@ -7719,13 +7518,6 @@
   <p:clrMapOvr>
     <a:masterClrMapping/>
   </p:clrMapOvr>
-  <p:timing>
-    <p:tnLst>
-      <p:par>
-        <p:cTn id="1" dur="indefinite" restart="never" nodeType="tmRoot"/>
-      </p:par>
-    </p:tnLst>
-  </p:timing>
 </p:sld>
 </file>
 
@@ -7764,8 +7556,8 @@
         </p:nvSpPr>
         <p:spPr>
           <a:xfrm>
-            <a:off x="628650" y="2931916"/>
-            <a:ext cx="7886700" cy="994172"/>
+            <a:off x="838200" y="2766218"/>
+            <a:ext cx="10515600" cy="1325563"/>
           </a:xfrm>
         </p:spPr>
         <p:txBody>
@@ -7776,7 +7568,7 @@
           <a:p>
             <a:pPr algn="ctr"/>
             <a:r>
-              <a:rPr lang="en-US" sz="6000" dirty="0"/>
+              <a:rPr lang="en-US" sz="8000" dirty="0"/>
               <a:t>Why bother?</a:t>
             </a:r>
           </a:p>
@@ -7792,13 +7584,6 @@
   <p:clrMapOvr>
     <a:masterClrMapping/>
   </p:clrMapOvr>
-  <p:timing>
-    <p:tnLst>
-      <p:par>
-        <p:cTn id="1" dur="indefinite" restart="never" nodeType="tmRoot"/>
-      </p:par>
-    </p:tnLst>
-  </p:timing>
 </p:sld>
 </file>
 
@@ -7837,8 +7622,8 @@
         </p:nvSpPr>
         <p:spPr>
           <a:xfrm>
-            <a:off x="628650" y="2931916"/>
-            <a:ext cx="7886700" cy="994172"/>
+            <a:off x="838200" y="2766218"/>
+            <a:ext cx="10515600" cy="1325563"/>
           </a:xfrm>
         </p:spPr>
         <p:txBody>
@@ -7849,7 +7634,7 @@
           <a:p>
             <a:pPr algn="ctr"/>
             <a:r>
-              <a:rPr lang="en-US" sz="5400" dirty="0"/>
+              <a:rPr lang="en-US" sz="7200" dirty="0"/>
               <a:t>Reusability</a:t>
             </a:r>
           </a:p>
@@ -7865,13 +7650,6 @@
   <p:clrMapOvr>
     <a:masterClrMapping/>
   </p:clrMapOvr>
-  <p:timing>
-    <p:tnLst>
-      <p:par>
-        <p:cTn id="1" dur="indefinite" restart="never" nodeType="tmRoot"/>
-      </p:par>
-    </p:tnLst>
-  </p:timing>
 </p:sld>
 </file>
 
@@ -7910,8 +7688,8 @@
         </p:nvSpPr>
         <p:spPr>
           <a:xfrm>
-            <a:off x="628650" y="2931916"/>
-            <a:ext cx="7886700" cy="994172"/>
+            <a:off x="838200" y="2766218"/>
+            <a:ext cx="10515600" cy="1325563"/>
           </a:xfrm>
         </p:spPr>
         <p:txBody>
@@ -7922,7 +7700,7 @@
           <a:p>
             <a:pPr algn="ctr"/>
             <a:r>
-              <a:rPr lang="en-US" sz="5400" dirty="0"/>
+              <a:rPr lang="en-US" sz="7200" dirty="0"/>
               <a:t>Simplicity</a:t>
             </a:r>
           </a:p>
@@ -7938,13 +7716,6 @@
   <p:clrMapOvr>
     <a:masterClrMapping/>
   </p:clrMapOvr>
-  <p:timing>
-    <p:tnLst>
-      <p:par>
-        <p:cTn id="1" dur="indefinite" restart="never" nodeType="tmRoot"/>
-      </p:par>
-    </p:tnLst>
-  </p:timing>
 </p:sld>
 </file>
 
@@ -7983,8 +7754,8 @@
         </p:nvSpPr>
         <p:spPr>
           <a:xfrm>
-            <a:off x="628650" y="2931916"/>
-            <a:ext cx="7886700" cy="994172"/>
+            <a:off x="838200" y="2766218"/>
+            <a:ext cx="10515600" cy="1325563"/>
           </a:xfrm>
         </p:spPr>
         <p:txBody>
@@ -7995,7 +7766,7 @@
           <a:p>
             <a:pPr algn="ctr"/>
             <a:r>
-              <a:rPr lang="en-US" sz="5400" dirty="0"/>
+              <a:rPr lang="en-US" sz="7200" dirty="0"/>
               <a:t>Speed</a:t>
             </a:r>
           </a:p>
@@ -8011,13 +7782,6 @@
   <p:clrMapOvr>
     <a:masterClrMapping/>
   </p:clrMapOvr>
-  <p:timing>
-    <p:tnLst>
-      <p:par>
-        <p:cTn id="1" dur="indefinite" restart="never" nodeType="tmRoot"/>
-      </p:par>
-    </p:tnLst>
-  </p:timing>
 </p:sld>
 </file>
 
@@ -8056,8 +7820,8 @@
         </p:nvSpPr>
         <p:spPr>
           <a:xfrm>
-            <a:off x="628650" y="2931916"/>
-            <a:ext cx="7886700" cy="994172"/>
+            <a:off x="838200" y="2766218"/>
+            <a:ext cx="10515600" cy="1325563"/>
           </a:xfrm>
         </p:spPr>
         <p:txBody>
@@ -8068,7 +7832,7 @@
           <a:p>
             <a:pPr algn="ctr"/>
             <a:r>
-              <a:rPr lang="en-US" sz="6000" dirty="0"/>
+              <a:rPr lang="en-US" sz="8000" dirty="0"/>
               <a:t>________.</a:t>
             </a:r>
             <a:r>
@@ -8092,13 +7856,6 @@
   <p:clrMapOvr>
     <a:masterClrMapping/>
   </p:clrMapOvr>
-  <p:timing>
-    <p:tnLst>
-      <p:par>
-        <p:cTn id="1" dur="indefinite" restart="never" nodeType="tmRoot"/>
-      </p:par>
-    </p:tnLst>
-  </p:timing>
 </p:sld>
 </file>
 
@@ -8148,8 +7905,8 @@
         </p:blipFill>
         <p:spPr bwMode="auto">
           <a:xfrm>
-            <a:off x="376701" y="1068031"/>
-            <a:ext cx="8390603" cy="4721945"/>
+            <a:off x="502265" y="281036"/>
+            <a:ext cx="11187470" cy="6295927"/>
           </a:xfrm>
           <a:prstGeom prst="rect">
             <a:avLst/>
@@ -8184,8 +7941,8 @@
         </p:nvSpPr>
         <p:spPr>
           <a:xfrm>
-            <a:off x="628650" y="1068030"/>
-            <a:ext cx="7886700" cy="994172"/>
+            <a:off x="838200" y="281036"/>
+            <a:ext cx="10515600" cy="1325563"/>
           </a:xfrm>
         </p:spPr>
         <p:txBody>
@@ -8196,7 +7953,7 @@
           <a:p>
             <a:pPr algn="ctr"/>
             <a:r>
-              <a:rPr lang="en-US" sz="4050" dirty="0">
+              <a:rPr lang="en-US" sz="5400" dirty="0">
                 <a:solidFill>
                   <a:schemeClr val="bg1">
                     <a:lumMod val="95000"/>
@@ -8218,13 +7975,6 @@
   <p:clrMapOvr>
     <a:masterClrMapping/>
   </p:clrMapOvr>
-  <p:timing>
-    <p:tnLst>
-      <p:par>
-        <p:cTn id="1" dur="indefinite" restart="never" nodeType="tmRoot"/>
-      </p:par>
-    </p:tnLst>
-  </p:timing>
 </p:sld>
 </file>
 
@@ -8263,8 +8013,8 @@
         </p:nvSpPr>
         <p:spPr>
           <a:xfrm>
-            <a:off x="628650" y="2931916"/>
-            <a:ext cx="7886700" cy="994172"/>
+            <a:off x="838200" y="2766218"/>
+            <a:ext cx="10515600" cy="1325563"/>
           </a:xfrm>
         </p:spPr>
         <p:txBody>
@@ -8275,7 +8025,7 @@
           <a:p>
             <a:pPr algn="ctr"/>
             <a:r>
-              <a:rPr lang="en-US" sz="5400" dirty="0"/>
+              <a:rPr lang="en-US" sz="7200" dirty="0"/>
               <a:t>Libraries</a:t>
             </a:r>
           </a:p>
@@ -8291,13 +8041,6 @@
   <p:clrMapOvr>
     <a:masterClrMapping/>
   </p:clrMapOvr>
-  <p:timing>
-    <p:tnLst>
-      <p:par>
-        <p:cTn id="1" dur="indefinite" restart="never" nodeType="tmRoot"/>
-      </p:par>
-    </p:tnLst>
-  </p:timing>
 </p:sld>
 </file>
 
@@ -8336,8 +8079,8 @@
         </p:nvSpPr>
         <p:spPr>
           <a:xfrm>
-            <a:off x="145954" y="2931916"/>
-            <a:ext cx="8852096" cy="994172"/>
+            <a:off x="194603" y="2766218"/>
+            <a:ext cx="11802794" cy="1325563"/>
           </a:xfrm>
         </p:spPr>
         <p:txBody>
@@ -8348,27 +8091,27 @@
           <a:p>
             <a:pPr algn="ctr"/>
             <a:r>
-              <a:rPr lang="en-US" sz="4500" u="sng" dirty="0"/>
+              <a:rPr lang="en-US" sz="6000" u="sng" dirty="0"/>
               <a:t>P</a:t>
             </a:r>
             <a:r>
-              <a:rPr lang="en-US" sz="4500" dirty="0"/>
+              <a:rPr lang="en-US" sz="6000" dirty="0"/>
               <a:t>rogressive </a:t>
             </a:r>
             <a:r>
-              <a:rPr lang="en-US" sz="4500" u="sng" dirty="0"/>
+              <a:rPr lang="en-US" sz="6000" u="sng" dirty="0"/>
               <a:t>W</a:t>
             </a:r>
             <a:r>
-              <a:rPr lang="en-US" sz="4500" dirty="0"/>
+              <a:rPr lang="en-US" sz="6000" dirty="0"/>
               <a:t>eb </a:t>
             </a:r>
             <a:r>
-              <a:rPr lang="en-US" sz="4500" u="sng" dirty="0"/>
+              <a:rPr lang="en-US" sz="6000" u="sng" dirty="0"/>
               <a:t>A</a:t>
             </a:r>
             <a:r>
-              <a:rPr lang="en-US" sz="4500" dirty="0"/>
+              <a:rPr lang="en-US" sz="6000" dirty="0"/>
               <a:t>pplications</a:t>
             </a:r>
           </a:p>
@@ -8384,13 +8127,6 @@
   <p:clrMapOvr>
     <a:masterClrMapping/>
   </p:clrMapOvr>
-  <p:timing>
-    <p:tnLst>
-      <p:par>
-        <p:cTn id="1" dur="indefinite" restart="never" nodeType="tmRoot"/>
-      </p:par>
-    </p:tnLst>
-  </p:timing>
 </p:sld>
 </file>
 
@@ -8429,8 +8165,8 @@
         </p:nvSpPr>
         <p:spPr>
           <a:xfrm>
-            <a:off x="628650" y="2931916"/>
-            <a:ext cx="7886700" cy="994172"/>
+            <a:off x="838200" y="2766218"/>
+            <a:ext cx="10515600" cy="1325563"/>
           </a:xfrm>
         </p:spPr>
         <p:txBody>
@@ -8441,14 +8177,14 @@
           <a:p>
             <a:pPr algn="ctr"/>
             <a:r>
-              <a:rPr lang="en-US" sz="4950" dirty="0"/>
+              <a:rPr lang="en-US" sz="6600" dirty="0"/>
               <a:t>#</a:t>
             </a:r>
             <a:r>
-              <a:rPr lang="en-US" sz="4950" dirty="0" err="1"/>
+              <a:rPr lang="en-US" sz="6600" dirty="0" err="1"/>
               <a:t>UseThePlatform</a:t>
             </a:r>
-            <a:endParaRPr lang="en-US" sz="4950" dirty="0"/>
+            <a:endParaRPr lang="en-US" sz="6600" dirty="0"/>
           </a:p>
         </p:txBody>
       </p:sp>
@@ -8462,13 +8198,6 @@
   <p:clrMapOvr>
     <a:masterClrMapping/>
   </p:clrMapOvr>
-  <p:timing>
-    <p:tnLst>
-      <p:par>
-        <p:cTn id="1" dur="indefinite" restart="never" nodeType="tmRoot"/>
-      </p:par>
-    </p:tnLst>
-  </p:timing>
 </p:sld>
 </file>
 
@@ -8501,8 +8230,8 @@
         </p:nvSpPr>
         <p:spPr>
           <a:xfrm>
-            <a:off x="427705" y="2878104"/>
-            <a:ext cx="8288594" cy="734827"/>
+            <a:off x="570271" y="2694469"/>
+            <a:ext cx="11051458" cy="979769"/>
           </a:xfrm>
         </p:spPr>
         <p:txBody>
@@ -8513,12 +8242,12 @@
           <a:p>
             <a:pPr algn="l"/>
             <a:r>
-              <a:rPr lang="en-US" sz="3300" dirty="0">
+              <a:rPr lang="en-US" sz="4400" dirty="0">
                 <a:cs typeface="Calibri Light"/>
               </a:rPr>
               <a:t>Winning With Web Components</a:t>
             </a:r>
-            <a:endParaRPr lang="en-US" sz="3300" dirty="0"/>
+            <a:endParaRPr lang="en-US" sz="4400" dirty="0"/>
           </a:p>
         </p:txBody>
       </p:sp>
@@ -8534,19 +8263,19 @@
         </p:nvSpPr>
         <p:spPr>
           <a:xfrm>
-            <a:off x="427704" y="3890254"/>
-            <a:ext cx="7854650" cy="1946960"/>
+            <a:off x="570270" y="4044005"/>
+            <a:ext cx="10472867" cy="2595946"/>
           </a:xfrm>
         </p:spPr>
         <p:txBody>
-          <a:bodyPr vert="horz" lIns="68580" tIns="34290" rIns="68580" bIns="34290" rtlCol="0" anchor="t">
-            <a:normAutofit fontScale="92500" lnSpcReduction="10000"/>
+          <a:bodyPr vert="horz" lIns="91440" tIns="45720" rIns="91440" bIns="45720" rtlCol="0" anchor="t">
+            <a:normAutofit/>
           </a:bodyPr>
           <a:lstStyle/>
           <a:p>
             <a:pPr algn="l"/>
             <a:r>
-              <a:rPr lang="en-US" sz="2100" dirty="0">
+              <a:rPr lang="en-US" sz="2800" dirty="0">
                 <a:cs typeface="Calibri"/>
               </a:rPr>
               <a:t>Dustin Ewers</a:t>
@@ -8617,15 +8346,15 @@
         </p:nvSpPr>
         <p:spPr>
           <a:xfrm>
-            <a:off x="427705" y="1262079"/>
-            <a:ext cx="8288594" cy="1338701"/>
+            <a:off x="570271" y="539768"/>
+            <a:ext cx="11051458" cy="1784934"/>
           </a:xfrm>
           <a:prstGeom prst="rect">
             <a:avLst/>
           </a:prstGeom>
         </p:spPr>
         <p:txBody>
-          <a:bodyPr vert="horz" lIns="68580" tIns="34290" rIns="68580" bIns="34290" rtlCol="0" anchor="b">
+          <a:bodyPr vert="horz" lIns="91440" tIns="45720" rIns="91440" bIns="45720" rtlCol="0" anchor="b">
             <a:normAutofit/>
           </a:bodyPr>
           <a:lstStyle>
@@ -8649,12 +8378,12 @@
           </a:lstStyle>
           <a:p>
             <a:r>
-              <a:rPr lang="en-US" sz="8625" dirty="0">
+              <a:rPr lang="en-US" sz="11500" dirty="0">
                 <a:cs typeface="Calibri Light"/>
               </a:rPr>
               <a:t>Thanks!</a:t>
             </a:r>
-            <a:endParaRPr lang="en-US" sz="8625" dirty="0"/>
+            <a:endParaRPr lang="en-US" sz="11500" dirty="0"/>
           </a:p>
         </p:txBody>
       </p:sp>
@@ -8668,13 +8397,6 @@
   <p:clrMapOvr>
     <a:masterClrMapping/>
   </p:clrMapOvr>
-  <p:timing>
-    <p:tnLst>
-      <p:par>
-        <p:cTn id="1" dur="indefinite" restart="never" nodeType="tmRoot"/>
-      </p:par>
-    </p:tnLst>
-  </p:timing>
 </p:sld>
 </file>
 
@@ -8797,13 +8519,6 @@
   <p:clrMapOvr>
     <a:masterClrMapping/>
   </p:clrMapOvr>
-  <p:timing>
-    <p:tnLst>
-      <p:par>
-        <p:cTn id="1" dur="indefinite" restart="never" nodeType="tmRoot"/>
-      </p:par>
-    </p:tnLst>
-  </p:timing>
 </p:sld>
 </file>
 
@@ -8842,14 +8557,12 @@
         </p:nvSpPr>
         <p:spPr>
           <a:xfrm>
-            <a:off x="628650" y="1131095"/>
-            <a:ext cx="7886700" cy="665175"/>
+            <a:off x="838200" y="365126"/>
+            <a:ext cx="10515600" cy="886900"/>
           </a:xfrm>
         </p:spPr>
         <p:txBody>
-          <a:bodyPr>
-            <a:normAutofit fontScale="90000"/>
-          </a:bodyPr>
+          <a:bodyPr/>
           <a:lstStyle/>
           <a:p>
             <a:pPr algn="ctr"/>
@@ -8882,8 +8595,8 @@
         </p:blipFill>
         <p:spPr>
           <a:xfrm>
-            <a:off x="332187" y="1970138"/>
-            <a:ext cx="8479631" cy="3571875"/>
+            <a:off x="442912" y="1483849"/>
+            <a:ext cx="11306175" cy="4762500"/>
           </a:xfrm>
           <a:prstGeom prst="rect">
             <a:avLst/>
@@ -8900,13 +8613,6 @@
   <p:clrMapOvr>
     <a:masterClrMapping/>
   </p:clrMapOvr>
-  <p:timing>
-    <p:tnLst>
-      <p:par>
-        <p:cTn id="1" dur="indefinite" restart="never" nodeType="tmRoot"/>
-      </p:par>
-    </p:tnLst>
-  </p:timing>
 </p:sld>
 </file>
 
@@ -8945,8 +8651,8 @@
         </p:nvSpPr>
         <p:spPr>
           <a:xfrm>
-            <a:off x="283465" y="1029069"/>
-            <a:ext cx="7886700" cy="994172"/>
+            <a:off x="377953" y="229090"/>
+            <a:ext cx="10515600" cy="1325563"/>
           </a:xfrm>
         </p:spPr>
         <p:txBody>
@@ -8982,8 +8688,8 @@
         </p:blipFill>
         <p:spPr>
           <a:xfrm>
-            <a:off x="283465" y="2178022"/>
-            <a:ext cx="8438340" cy="994172"/>
+            <a:off x="377953" y="1761028"/>
+            <a:ext cx="11251120" cy="1325563"/>
           </a:xfrm>
           <a:prstGeom prst="rect">
             <a:avLst/>
@@ -9012,8 +8718,8 @@
         </p:blipFill>
         <p:spPr>
           <a:xfrm>
-            <a:off x="283465" y="3481756"/>
-            <a:ext cx="7747970" cy="994172"/>
+            <a:off x="377953" y="3499340"/>
+            <a:ext cx="10330627" cy="1325563"/>
           </a:xfrm>
           <a:prstGeom prst="rect">
             <a:avLst/>
@@ -9030,13 +8736,6 @@
   <p:clrMapOvr>
     <a:masterClrMapping/>
   </p:clrMapOvr>
-  <p:timing>
-    <p:tnLst>
-      <p:par>
-        <p:cTn id="1" dur="indefinite" restart="never" nodeType="tmRoot"/>
-      </p:par>
-    </p:tnLst>
-  </p:timing>
 </p:sld>
 </file>
 
@@ -9107,8 +8806,8 @@
         </p:blipFill>
         <p:spPr>
           <a:xfrm>
-            <a:off x="628651" y="2080427"/>
-            <a:ext cx="6999206" cy="3060437"/>
+            <a:off x="838200" y="1630900"/>
+            <a:ext cx="9332275" cy="4080583"/>
           </a:xfrm>
           <a:prstGeom prst="rect">
             <a:avLst/>
@@ -9125,13 +8824,6 @@
   <p:clrMapOvr>
     <a:masterClrMapping/>
   </p:clrMapOvr>
-  <p:timing>
-    <p:tnLst>
-      <p:par>
-        <p:cTn id="1" dur="indefinite" restart="never" nodeType="tmRoot"/>
-      </p:par>
-    </p:tnLst>
-  </p:timing>
 </p:sld>
 </file>
 
@@ -9202,8 +8894,8 @@
         </p:blipFill>
         <p:spPr>
           <a:xfrm>
-            <a:off x="628650" y="2030310"/>
-            <a:ext cx="6921946" cy="3311018"/>
+            <a:off x="838200" y="1564079"/>
+            <a:ext cx="9229261" cy="4414690"/>
           </a:xfrm>
           <a:prstGeom prst="rect">
             <a:avLst/>
@@ -9220,13 +8912,6 @@
   <p:clrMapOvr>
     <a:masterClrMapping/>
   </p:clrMapOvr>
-  <p:timing>
-    <p:tnLst>
-      <p:par>
-        <p:cTn id="1" dur="indefinite" restart="never" nodeType="tmRoot"/>
-      </p:par>
-    </p:tnLst>
-  </p:timing>
 </p:sld>
 </file>
 
@@ -9261,8 +8946,8 @@
         </p:nvSpPr>
         <p:spPr>
           <a:xfrm>
-            <a:off x="246185" y="1003830"/>
-            <a:ext cx="8651631" cy="4850340"/>
+            <a:off x="328246" y="195440"/>
+            <a:ext cx="11535508" cy="6467120"/>
           </a:xfrm>
           <a:prstGeom prst="rect">
             <a:avLst/>
@@ -9292,7 +8977,7 @@
           <a:lstStyle/>
           <a:p>
             <a:pPr algn="ctr"/>
-            <a:endParaRPr lang="en-US" sz="1350"/>
+            <a:endParaRPr lang="en-US"/>
           </a:p>
         </p:txBody>
       </p:sp>
@@ -9310,8 +8995,8 @@
         </p:nvSpPr>
         <p:spPr>
           <a:xfrm>
-            <a:off x="796693" y="2356184"/>
-            <a:ext cx="2164667" cy="646331"/>
+            <a:off x="1062255" y="1998579"/>
+            <a:ext cx="2886223" cy="461665"/>
           </a:xfrm>
           <a:prstGeom prst="rect">
             <a:avLst/>
@@ -9325,7 +9010,7 @@
           <a:lstStyle/>
           <a:p>
             <a:r>
-              <a:rPr lang="en-US" b="1" dirty="0"/>
+              <a:rPr lang="en-US" sz="2400" b="1" dirty="0"/>
               <a:t>Web Components</a:t>
             </a:r>
           </a:p>
@@ -9345,8 +9030,8 @@
         </p:nvSpPr>
         <p:spPr>
           <a:xfrm>
-            <a:off x="4508697" y="2807416"/>
-            <a:ext cx="1881554" cy="300082"/>
+            <a:off x="6011594" y="2600221"/>
+            <a:ext cx="2508738" cy="369332"/>
           </a:xfrm>
           <a:prstGeom prst="rect">
             <a:avLst/>
@@ -9361,7 +9046,7 @@
           <a:p>
             <a:pPr algn="ctr"/>
             <a:r>
-              <a:rPr lang="en-US" sz="1350" b="1" dirty="0"/>
+              <a:rPr lang="en-US" b="1" dirty="0"/>
               <a:t>Angular</a:t>
             </a:r>
           </a:p>
@@ -9381,8 +9066,8 @@
         </p:nvSpPr>
         <p:spPr>
           <a:xfrm>
-            <a:off x="4616624" y="1332479"/>
-            <a:ext cx="1665699" cy="300082"/>
+            <a:off x="6155497" y="633639"/>
+            <a:ext cx="2220932" cy="369332"/>
           </a:xfrm>
           <a:prstGeom prst="rect">
             <a:avLst/>
@@ -9397,7 +9082,7 @@
           <a:p>
             <a:pPr algn="ctr"/>
             <a:r>
-              <a:rPr lang="en-US" sz="1350" b="1" dirty="0"/>
+              <a:rPr lang="en-US" b="1" dirty="0"/>
               <a:t>React</a:t>
             </a:r>
           </a:p>
@@ -9417,8 +9102,8 @@
         </p:nvSpPr>
         <p:spPr>
           <a:xfrm>
-            <a:off x="4508697" y="4294092"/>
-            <a:ext cx="1881554" cy="300082"/>
+            <a:off x="6011594" y="4582456"/>
+            <a:ext cx="2508738" cy="369332"/>
           </a:xfrm>
           <a:prstGeom prst="rect">
             <a:avLst/>
@@ -9433,7 +9118,7 @@
           <a:p>
             <a:pPr algn="ctr"/>
             <a:r>
-              <a:rPr lang="en-US" sz="1350" b="1" dirty="0"/>
+              <a:rPr lang="en-US" b="1" dirty="0"/>
               <a:t>Vanilla JS</a:t>
             </a:r>
           </a:p>
@@ -9453,8 +9138,8 @@
         </p:nvSpPr>
         <p:spPr>
           <a:xfrm>
-            <a:off x="1084749" y="2847353"/>
-            <a:ext cx="685800" cy="685800"/>
+            <a:off x="1446332" y="2653471"/>
+            <a:ext cx="914400" cy="914400"/>
           </a:xfrm>
           <a:prstGeom prst="rect">
             <a:avLst/>
@@ -9484,7 +9169,7 @@
           <a:lstStyle/>
           <a:p>
             <a:pPr algn="ctr"/>
-            <a:endParaRPr lang="en-US" sz="1350"/>
+            <a:endParaRPr lang="en-US"/>
           </a:p>
         </p:txBody>
       </p:sp>
@@ -9502,8 +9187,8 @@
         </p:nvSpPr>
         <p:spPr>
           <a:xfrm>
-            <a:off x="1084749" y="3651849"/>
-            <a:ext cx="685800" cy="685800"/>
+            <a:off x="1446332" y="3726132"/>
+            <a:ext cx="914400" cy="914400"/>
           </a:xfrm>
           <a:prstGeom prst="rect">
             <a:avLst/>
@@ -9533,7 +9218,7 @@
           <a:lstStyle/>
           <a:p>
             <a:pPr algn="ctr"/>
-            <a:endParaRPr lang="en-US" sz="1350"/>
+            <a:endParaRPr lang="en-US"/>
           </a:p>
         </p:txBody>
       </p:sp>
@@ -9551,8 +9236,8 @@
         </p:nvSpPr>
         <p:spPr>
           <a:xfrm>
-            <a:off x="1926613" y="2847353"/>
-            <a:ext cx="685800" cy="685800"/>
+            <a:off x="2568817" y="2653471"/>
+            <a:ext cx="914400" cy="914400"/>
           </a:xfrm>
           <a:prstGeom prst="rect">
             <a:avLst/>
@@ -9582,7 +9267,7 @@
           <a:lstStyle/>
           <a:p>
             <a:pPr algn="ctr"/>
-            <a:endParaRPr lang="en-US" sz="1350"/>
+            <a:endParaRPr lang="en-US"/>
           </a:p>
         </p:txBody>
       </p:sp>
@@ -9600,8 +9285,8 @@
         </p:nvSpPr>
         <p:spPr>
           <a:xfrm>
-            <a:off x="1926613" y="3651849"/>
-            <a:ext cx="685800" cy="685800"/>
+            <a:off x="2568817" y="3726132"/>
+            <a:ext cx="914400" cy="914400"/>
           </a:xfrm>
           <a:prstGeom prst="rect">
             <a:avLst/>
@@ -9631,7 +9316,7 @@
           <a:lstStyle/>
           <a:p>
             <a:pPr algn="ctr"/>
-            <a:endParaRPr lang="en-US" sz="1350"/>
+            <a:endParaRPr lang="en-US"/>
           </a:p>
         </p:txBody>
       </p:sp>
@@ -9649,8 +9334,8 @@
         </p:nvSpPr>
         <p:spPr>
           <a:xfrm>
-            <a:off x="4009292" y="1621219"/>
-            <a:ext cx="2880360" cy="1078984"/>
+            <a:off x="5345723" y="1018622"/>
+            <a:ext cx="3840480" cy="1438645"/>
           </a:xfrm>
           <a:prstGeom prst="rect">
             <a:avLst/>
@@ -9677,7 +9362,7 @@
           <a:lstStyle/>
           <a:p>
             <a:pPr algn="ctr"/>
-            <a:endParaRPr lang="en-US" sz="1350"/>
+            <a:endParaRPr lang="en-US"/>
           </a:p>
         </p:txBody>
       </p:sp>
@@ -9695,8 +9380,8 @@
         </p:nvSpPr>
         <p:spPr>
           <a:xfrm>
-            <a:off x="4009292" y="3107894"/>
-            <a:ext cx="2880360" cy="1078984"/>
+            <a:off x="5345723" y="3000856"/>
+            <a:ext cx="3840480" cy="1438645"/>
           </a:xfrm>
           <a:prstGeom prst="rect">
             <a:avLst/>
@@ -9723,7 +9408,7 @@
           <a:lstStyle/>
           <a:p>
             <a:pPr algn="ctr"/>
-            <a:endParaRPr lang="en-US" sz="1350"/>
+            <a:endParaRPr lang="en-US"/>
           </a:p>
         </p:txBody>
       </p:sp>
@@ -9741,8 +9426,8 @@
         </p:nvSpPr>
         <p:spPr>
           <a:xfrm>
-            <a:off x="4009292" y="4594571"/>
-            <a:ext cx="2880360" cy="1078984"/>
+            <a:off x="5345723" y="4983091"/>
+            <a:ext cx="3840480" cy="1438645"/>
           </a:xfrm>
           <a:prstGeom prst="rect">
             <a:avLst/>
@@ -9769,7 +9454,7 @@
           <a:lstStyle/>
           <a:p>
             <a:pPr algn="ctr"/>
-            <a:endParaRPr lang="en-US" sz="1350"/>
+            <a:endParaRPr lang="en-US"/>
           </a:p>
         </p:txBody>
       </p:sp>
@@ -9787,8 +9472,8 @@
         </p:nvSpPr>
         <p:spPr>
           <a:xfrm>
-            <a:off x="4184808" y="1822034"/>
-            <a:ext cx="685800" cy="685800"/>
+            <a:off x="5579744" y="1286378"/>
+            <a:ext cx="914400" cy="914400"/>
           </a:xfrm>
           <a:prstGeom prst="rect">
             <a:avLst/>
@@ -9818,7 +9503,7 @@
           <a:lstStyle/>
           <a:p>
             <a:pPr algn="ctr"/>
-            <a:endParaRPr lang="en-US" sz="1350"/>
+            <a:endParaRPr lang="en-US"/>
           </a:p>
         </p:txBody>
       </p:sp>
@@ -9836,8 +9521,8 @@
         </p:nvSpPr>
         <p:spPr>
           <a:xfrm>
-            <a:off x="5026672" y="1822034"/>
-            <a:ext cx="685800" cy="685800"/>
+            <a:off x="6702229" y="1286378"/>
+            <a:ext cx="914400" cy="914400"/>
           </a:xfrm>
           <a:prstGeom prst="rect">
             <a:avLst/>
@@ -9867,7 +9552,7 @@
           <a:lstStyle/>
           <a:p>
             <a:pPr algn="ctr"/>
-            <a:endParaRPr lang="en-US" sz="1350"/>
+            <a:endParaRPr lang="en-US"/>
           </a:p>
         </p:txBody>
       </p:sp>
@@ -9885,8 +9570,8 @@
         </p:nvSpPr>
         <p:spPr>
           <a:xfrm>
-            <a:off x="5938985" y="1822034"/>
-            <a:ext cx="685800" cy="685800"/>
+            <a:off x="7918646" y="1286378"/>
+            <a:ext cx="914400" cy="914400"/>
           </a:xfrm>
           <a:prstGeom prst="rect">
             <a:avLst/>
@@ -9916,7 +9601,7 @@
           <a:lstStyle/>
           <a:p>
             <a:pPr algn="ctr"/>
-            <a:endParaRPr lang="en-US" sz="1350"/>
+            <a:endParaRPr lang="en-US"/>
           </a:p>
         </p:txBody>
       </p:sp>
@@ -9934,8 +9619,8 @@
         </p:nvSpPr>
         <p:spPr>
           <a:xfrm>
-            <a:off x="4291524" y="3351512"/>
-            <a:ext cx="685800" cy="685800"/>
+            <a:off x="5722032" y="3325683"/>
+            <a:ext cx="914400" cy="914400"/>
           </a:xfrm>
           <a:prstGeom prst="rect">
             <a:avLst/>
@@ -9965,7 +9650,7 @@
           <a:lstStyle/>
           <a:p>
             <a:pPr algn="ctr"/>
-            <a:endParaRPr lang="en-US" sz="1350"/>
+            <a:endParaRPr lang="en-US"/>
           </a:p>
         </p:txBody>
       </p:sp>
@@ -9983,8 +9668,8 @@
         </p:nvSpPr>
         <p:spPr>
           <a:xfrm>
-            <a:off x="5133388" y="3351512"/>
-            <a:ext cx="685800" cy="685800"/>
+            <a:off x="6844517" y="3325683"/>
+            <a:ext cx="914400" cy="914400"/>
           </a:xfrm>
           <a:prstGeom prst="rect">
             <a:avLst/>
@@ -10014,7 +9699,7 @@
           <a:lstStyle/>
           <a:p>
             <a:pPr algn="ctr"/>
-            <a:endParaRPr lang="en-US" sz="1350"/>
+            <a:endParaRPr lang="en-US"/>
           </a:p>
         </p:txBody>
       </p:sp>
@@ -10032,8 +9717,8 @@
         </p:nvSpPr>
         <p:spPr>
           <a:xfrm>
-            <a:off x="6045701" y="3351512"/>
-            <a:ext cx="685800" cy="685800"/>
+            <a:off x="8060934" y="3325683"/>
+            <a:ext cx="914400" cy="914400"/>
           </a:xfrm>
           <a:prstGeom prst="rect">
             <a:avLst/>
@@ -10063,7 +9748,7 @@
           <a:lstStyle/>
           <a:p>
             <a:pPr algn="ctr"/>
-            <a:endParaRPr lang="en-US" sz="1350"/>
+            <a:endParaRPr lang="en-US"/>
           </a:p>
         </p:txBody>
       </p:sp>
@@ -10081,8 +9766,8 @@
         </p:nvSpPr>
         <p:spPr>
           <a:xfrm>
-            <a:off x="4291524" y="4781508"/>
-            <a:ext cx="685800" cy="685800"/>
+            <a:off x="5722032" y="5232344"/>
+            <a:ext cx="914400" cy="914400"/>
           </a:xfrm>
           <a:prstGeom prst="rect">
             <a:avLst/>
@@ -10112,7 +9797,7 @@
           <a:lstStyle/>
           <a:p>
             <a:pPr algn="ctr"/>
-            <a:endParaRPr lang="en-US" sz="1350"/>
+            <a:endParaRPr lang="en-US"/>
           </a:p>
         </p:txBody>
       </p:sp>
@@ -10130,8 +9815,8 @@
         </p:nvSpPr>
         <p:spPr>
           <a:xfrm>
-            <a:off x="5133388" y="4781508"/>
-            <a:ext cx="685800" cy="685800"/>
+            <a:off x="6844517" y="5232344"/>
+            <a:ext cx="914400" cy="914400"/>
           </a:xfrm>
           <a:prstGeom prst="rect">
             <a:avLst/>
@@ -10161,7 +9846,7 @@
           <a:lstStyle/>
           <a:p>
             <a:pPr algn="ctr"/>
-            <a:endParaRPr lang="en-US" sz="1350"/>
+            <a:endParaRPr lang="en-US"/>
           </a:p>
         </p:txBody>
       </p:sp>
@@ -10179,8 +9864,8 @@
         </p:nvSpPr>
         <p:spPr>
           <a:xfrm>
-            <a:off x="6045701" y="4781508"/>
-            <a:ext cx="685800" cy="685800"/>
+            <a:off x="8060934" y="5232344"/>
+            <a:ext cx="914400" cy="914400"/>
           </a:xfrm>
           <a:prstGeom prst="rect">
             <a:avLst/>
@@ -10210,7 +9895,7 @@
           <a:lstStyle/>
           <a:p>
             <a:pPr algn="ctr"/>
-            <a:endParaRPr lang="en-US" sz="1350"/>
+            <a:endParaRPr lang="en-US"/>
           </a:p>
         </p:txBody>
       </p:sp>
@@ -10224,13 +9909,6 @@
   <p:clrMapOvr>
     <a:masterClrMapping/>
   </p:clrMapOvr>
-  <p:timing>
-    <p:tnLst>
-      <p:par>
-        <p:cTn id="1" dur="indefinite" restart="never" nodeType="tmRoot"/>
-      </p:par>
-    </p:tnLst>
-  </p:timing>
 </p:sld>
 </file>
 
@@ -10269,8 +9947,8 @@
         </p:nvSpPr>
         <p:spPr>
           <a:xfrm>
-            <a:off x="628650" y="2931916"/>
-            <a:ext cx="7886700" cy="994172"/>
+            <a:off x="838200" y="2766218"/>
+            <a:ext cx="10515600" cy="1325563"/>
           </a:xfrm>
         </p:spPr>
         <p:txBody>
@@ -10295,20 +9973,13 @@
   <p:clrMapOvr>
     <a:masterClrMapping/>
   </p:clrMapOvr>
-  <p:timing>
-    <p:tnLst>
-      <p:par>
-        <p:cTn id="1" dur="indefinite" restart="never" nodeType="tmRoot"/>
-      </p:par>
-    </p:tnLst>
-  </p:timing>
 </p:sld>
 </file>
 
 <file path=ppt/theme/theme1.xml><?xml version="1.0" encoding="utf-8"?>
 <a:theme xmlns:a="http://schemas.openxmlformats.org/drawingml/2006/main" name="Office Theme">
   <a:themeElements>
-    <a:clrScheme name="Office Theme">
+    <a:clrScheme name="Office">
       <a:dk1>
         <a:sysClr val="windowText" lastClr="000000"/>
       </a:dk1>
@@ -10346,14 +10017,14 @@
         <a:srgbClr val="954F72"/>
       </a:folHlink>
     </a:clrScheme>
-    <a:fontScheme name="Office Theme">
+    <a:fontScheme name="Century Gothic">
       <a:majorFont>
-        <a:latin typeface="Calibri Light" panose="020F0302020204030204"/>
+        <a:latin typeface="Century Gothic" panose="020F0302020204030204"/>
         <a:ea typeface=""/>
         <a:cs typeface=""/>
-        <a:font script="Jpan" typeface="游ゴシック Light"/>
+        <a:font script="Jpan" typeface="メイリオ"/>
         <a:font script="Hang" typeface="맑은 고딕"/>
-        <a:font script="Hans" typeface="等线 Light"/>
+        <a:font script="Hans" typeface="宋体"/>
         <a:font script="Hant" typeface="新細明體"/>
         <a:font script="Arab" typeface="Times New Roman"/>
         <a:font script="Hebr" typeface="Times New Roman"/>
@@ -10383,12 +10054,12 @@
         <a:font script="Geor" typeface="Sylfaen"/>
       </a:majorFont>
       <a:minorFont>
-        <a:latin typeface="Calibri" panose="020F0502020204030204"/>
+        <a:latin typeface="Century Gothic" panose="020F0302020204030204"/>
         <a:ea typeface=""/>
         <a:cs typeface=""/>
-        <a:font script="Jpan" typeface="游ゴシック"/>
+        <a:font script="Jpan" typeface="メイリオ"/>
         <a:font script="Hang" typeface="맑은 고딕"/>
-        <a:font script="Hans" typeface="等线"/>
+        <a:font script="Hans" typeface="宋体"/>
         <a:font script="Hant" typeface="新細明體"/>
         <a:font script="Arab" typeface="Arial"/>
         <a:font script="Hebr" typeface="Arial"/>
@@ -10418,7 +10089,7 @@
         <a:font script="Geor" typeface="Sylfaen"/>
       </a:minorFont>
     </a:fontScheme>
-    <a:fmtScheme name="Office Theme">
+    <a:fmtScheme name="Office">
       <a:fillStyleLst>
         <a:solidFill>
           <a:schemeClr val="phClr"/>

</xml_diff>